<commit_message>
new version of git/github/gitclient picture
</commit_message>
<xml_diff>
--- a/non-mkdocs resources/git_github_gitclient_image.pptx
+++ b/non-mkdocs resources/git_github_gitclient_image.pptx
@@ -5,10 +5,13 @@
     <p:sldMasterId id="2147483648" r:id="rId1"/>
   </p:sldMasterIdLst>
   <p:notesMasterIdLst>
-    <p:notesMasterId r:id="rId3"/>
+    <p:notesMasterId r:id="rId6"/>
   </p:notesMasterIdLst>
   <p:sldIdLst>
-    <p:sldId id="340" r:id="rId2"/>
+    <p:sldId id="341" r:id="rId2"/>
+    <p:sldId id="342" r:id="rId3"/>
+    <p:sldId id="345" r:id="rId4"/>
+    <p:sldId id="346" r:id="rId5"/>
   </p:sldIdLst>
   <p:sldSz cx="12192000" cy="6858000"/>
   <p:notesSz cx="6858000" cy="9144000"/>
@@ -208,7 +211,7 @@
           <a:p>
             <a:fld id="{B1C46BBB-769C-F640-B863-1BAFC25FDA47}" type="datetimeFigureOut">
               <a:rPr lang="en-US" smtClean="0"/>
-              <a:t>3/7/2019</a:t>
+              <a:t>3/19/2019</a:t>
             </a:fld>
             <a:endParaRPr lang="en-US"/>
           </a:p>
@@ -1274,7 +1277,7 @@
             <a:fld id="{D9AFFF4A-806C-EA44-A220-CFCF99192DAA}" type="datetime1">
               <a:rPr lang="en-US" smtClean="0"/>
               <a:pPr/>
-              <a:t>3/7/2019</a:t>
+              <a:t>3/19/2019</a:t>
             </a:fld>
             <a:endParaRPr lang="en-US" dirty="0"/>
           </a:p>
@@ -1693,7 +1696,7 @@
             <a:fld id="{D9AFFF4A-806C-EA44-A220-CFCF99192DAA}" type="datetime1">
               <a:rPr lang="en-US" smtClean="0"/>
               <a:pPr/>
-              <a:t>3/7/2019</a:t>
+              <a:t>3/19/2019</a:t>
             </a:fld>
             <a:endParaRPr lang="en-US" dirty="0"/>
           </a:p>
@@ -1924,7 +1927,7 @@
             <a:fld id="{D9AFFF4A-806C-EA44-A220-CFCF99192DAA}" type="datetime1">
               <a:rPr lang="en-US" smtClean="0"/>
               <a:pPr/>
-              <a:t>3/7/2019</a:t>
+              <a:t>3/19/2019</a:t>
             </a:fld>
             <a:endParaRPr lang="en-US" dirty="0"/>
           </a:p>
@@ -2091,7 +2094,7 @@
             <a:fld id="{D9AFFF4A-806C-EA44-A220-CFCF99192DAA}" type="datetime1">
               <a:rPr lang="en-US" smtClean="0"/>
               <a:pPr/>
-              <a:t>3/7/2019</a:t>
+              <a:t>3/19/2019</a:t>
             </a:fld>
             <a:endParaRPr lang="en-US" dirty="0"/>
           </a:p>
@@ -2351,7 +2354,7 @@
           <a:p>
             <a:fld id="{78BFC871-B6C1-4D4E-A315-E9B623D8EE7D}" type="datetime1">
               <a:rPr lang="en-US" smtClean="0"/>
-              <a:t>3/7/2019</a:t>
+              <a:t>3/19/2019</a:t>
             </a:fld>
             <a:endParaRPr lang="en-US"/>
           </a:p>
@@ -2709,8 +2712,18 @@
 </file>
 
 <file path=ppt/slides/slide1.xml><?xml version="1.0" encoding="utf-8"?>
-<p:sld xmlns:a="http://schemas.openxmlformats.org/drawingml/2006/main" xmlns:r="http://schemas.openxmlformats.org/officeDocument/2006/relationships" xmlns:p="http://schemas.openxmlformats.org/presentationml/2006/main">
+<p:sld xmlns:a="http://schemas.openxmlformats.org/drawingml/2006/main" xmlns:r="http://schemas.openxmlformats.org/officeDocument/2006/relationships" xmlns:p="http://schemas.openxmlformats.org/presentationml/2006/main" showMasterSp="0">
   <p:cSld>
+    <p:bg>
+      <p:bgPr>
+        <a:solidFill>
+          <a:schemeClr val="bg1">
+            <a:alpha val="0"/>
+          </a:schemeClr>
+        </a:solidFill>
+        <a:effectLst/>
+      </p:bgPr>
+    </p:bg>
     <p:spTree>
       <p:nvGrpSpPr>
         <p:cNvPr id="1" name=""/>
@@ -2725,6 +2738,190 @@
           <a:chExt cx="0" cy="0"/>
         </a:xfrm>
       </p:grpSpPr>
+      <p:sp>
+        <p:nvSpPr>
+          <p:cNvPr id="26" name="Rectangle: Rounded Corners 25">
+            <a:extLst>
+              <a:ext uri="{FF2B5EF4-FFF2-40B4-BE49-F238E27FC236}">
+                <a16:creationId xmlns:a16="http://schemas.microsoft.com/office/drawing/2014/main" id="{525FA5A2-7D1C-4E62-84AE-F95348672B2F}"/>
+              </a:ext>
+            </a:extLst>
+          </p:cNvPr>
+          <p:cNvSpPr/>
+          <p:nvPr/>
+        </p:nvSpPr>
+        <p:spPr>
+          <a:xfrm>
+            <a:off x="451336" y="4503754"/>
+            <a:ext cx="2291849" cy="2068434"/>
+          </a:xfrm>
+          <a:prstGeom prst="roundRect">
+            <a:avLst/>
+          </a:prstGeom>
+          <a:noFill/>
+          <a:ln>
+            <a:solidFill>
+              <a:srgbClr val="3F51B5"/>
+            </a:solidFill>
+          </a:ln>
+        </p:spPr>
+        <p:style>
+          <a:lnRef idx="2">
+            <a:schemeClr val="accent1">
+              <a:shade val="50000"/>
+            </a:schemeClr>
+          </a:lnRef>
+          <a:fillRef idx="1">
+            <a:schemeClr val="accent1"/>
+          </a:fillRef>
+          <a:effectRef idx="0">
+            <a:schemeClr val="accent1"/>
+          </a:effectRef>
+          <a:fontRef idx="minor">
+            <a:schemeClr val="lt1"/>
+          </a:fontRef>
+        </p:style>
+        <p:txBody>
+          <a:bodyPr rtlCol="0" anchor="ctr"/>
+          <a:lstStyle/>
+          <a:p>
+            <a:r>
+              <a:rPr lang="en-US" sz="3200" dirty="0">
+                <a:solidFill>
+                  <a:schemeClr val="tx1"/>
+                </a:solidFill>
+              </a:rPr>
+              <a:t>Git</a:t>
+            </a:r>
+          </a:p>
+          <a:p>
+            <a:r>
+              <a:rPr lang="en-US" sz="3200" dirty="0">
+                <a:solidFill>
+                  <a:schemeClr val="tx1"/>
+                </a:solidFill>
+              </a:rPr>
+              <a:t>Client</a:t>
+            </a:r>
+          </a:p>
+        </p:txBody>
+      </p:sp>
+      <p:sp>
+        <p:nvSpPr>
+          <p:cNvPr id="23" name="Rectangle: Rounded Corners 22">
+            <a:extLst>
+              <a:ext uri="{FF2B5EF4-FFF2-40B4-BE49-F238E27FC236}">
+                <a16:creationId xmlns:a16="http://schemas.microsoft.com/office/drawing/2014/main" id="{2C1879ED-87D0-425F-84A1-D4F0BDB35DE2}"/>
+              </a:ext>
+            </a:extLst>
+          </p:cNvPr>
+          <p:cNvSpPr/>
+          <p:nvPr/>
+        </p:nvSpPr>
+        <p:spPr>
+          <a:xfrm>
+            <a:off x="451336" y="312754"/>
+            <a:ext cx="2291863" cy="1817828"/>
+          </a:xfrm>
+          <a:prstGeom prst="roundRect">
+            <a:avLst/>
+          </a:prstGeom>
+          <a:noFill/>
+          <a:ln>
+            <a:solidFill>
+              <a:srgbClr val="3F51B5"/>
+            </a:solidFill>
+          </a:ln>
+        </p:spPr>
+        <p:style>
+          <a:lnRef idx="2">
+            <a:schemeClr val="accent1">
+              <a:shade val="50000"/>
+            </a:schemeClr>
+          </a:lnRef>
+          <a:fillRef idx="1">
+            <a:schemeClr val="accent1"/>
+          </a:fillRef>
+          <a:effectRef idx="0">
+            <a:schemeClr val="accent1"/>
+          </a:effectRef>
+          <a:fontRef idx="minor">
+            <a:schemeClr val="lt1"/>
+          </a:fontRef>
+        </p:style>
+        <p:txBody>
+          <a:bodyPr rtlCol="0" anchor="ctr"/>
+          <a:lstStyle/>
+          <a:p>
+            <a:r>
+              <a:rPr lang="en-US" sz="3200" dirty="0">
+                <a:solidFill>
+                  <a:schemeClr val="tx1"/>
+                </a:solidFill>
+              </a:rPr>
+              <a:t>GitHub</a:t>
+            </a:r>
+          </a:p>
+        </p:txBody>
+      </p:sp>
+      <p:sp>
+        <p:nvSpPr>
+          <p:cNvPr id="22" name="Rectangle: Rounded Corners 21">
+            <a:extLst>
+              <a:ext uri="{FF2B5EF4-FFF2-40B4-BE49-F238E27FC236}">
+                <a16:creationId xmlns:a16="http://schemas.microsoft.com/office/drawing/2014/main" id="{7ACF9D3B-13EA-45FB-BA10-2BB7ED86EA3D}"/>
+              </a:ext>
+            </a:extLst>
+          </p:cNvPr>
+          <p:cNvSpPr/>
+          <p:nvPr/>
+        </p:nvSpPr>
+        <p:spPr>
+          <a:xfrm>
+            <a:off x="451336" y="2321322"/>
+            <a:ext cx="2291849" cy="1991691"/>
+          </a:xfrm>
+          <a:prstGeom prst="roundRect">
+            <a:avLst/>
+          </a:prstGeom>
+          <a:noFill/>
+          <a:ln>
+            <a:solidFill>
+              <a:srgbClr val="3F51B5"/>
+            </a:solidFill>
+          </a:ln>
+        </p:spPr>
+        <p:style>
+          <a:lnRef idx="2">
+            <a:schemeClr val="accent1">
+              <a:shade val="50000"/>
+            </a:schemeClr>
+          </a:lnRef>
+          <a:fillRef idx="1">
+            <a:schemeClr val="accent1"/>
+          </a:fillRef>
+          <a:effectRef idx="0">
+            <a:schemeClr val="accent1"/>
+          </a:effectRef>
+          <a:fontRef idx="minor">
+            <a:schemeClr val="lt1"/>
+          </a:fontRef>
+        </p:style>
+        <p:txBody>
+          <a:bodyPr rtlCol="0" anchor="ctr"/>
+          <a:lstStyle/>
+          <a:p>
+            <a:r>
+              <a:rPr lang="en-US" sz="3200" dirty="0">
+                <a:solidFill>
+                  <a:schemeClr val="tx1"/>
+                </a:solidFill>
+              </a:rPr>
+              <a:t>Git</a:t>
+            </a:r>
+          </a:p>
+        </p:txBody>
+      </p:sp>
       <p:cxnSp>
         <p:nvCxnSpPr>
           <p:cNvPr id="6" name="Straight Connector 5">
@@ -2800,7 +2997,7 @@
         </p:blipFill>
         <p:spPr bwMode="auto">
           <a:xfrm>
-            <a:off x="7458035" y="535080"/>
+            <a:off x="7620000" y="535080"/>
             <a:ext cx="1905000" cy="1905000"/>
           </a:xfrm>
           <a:prstGeom prst="rect">
@@ -2946,6 +3143,706 @@
           </a:extLst>
         </p:spPr>
       </p:pic>
+      <p:pic>
+        <p:nvPicPr>
+          <p:cNvPr id="1032" name="Picture 8" descr="Image result for github desktop logo">
+            <a:extLst>
+              <a:ext uri="{FF2B5EF4-FFF2-40B4-BE49-F238E27FC236}">
+                <a16:creationId xmlns:a16="http://schemas.microsoft.com/office/drawing/2014/main" id="{F36541F4-2BDF-4238-9527-91A40211E8D7}"/>
+              </a:ext>
+            </a:extLst>
+          </p:cNvPr>
+          <p:cNvPicPr>
+            <a:picLocks noChangeAspect="1" noChangeArrowheads="1"/>
+          </p:cNvPicPr>
+          <p:nvPr/>
+        </p:nvPicPr>
+        <p:blipFill rotWithShape="1">
+          <a:blip r:embed="rId6">
+            <a:extLst>
+              <a:ext uri="{28A0092B-C50C-407E-A947-70E740481C1C}">
+                <a14:useLocalDpi xmlns:a14="http://schemas.microsoft.com/office/drawing/2010/main" val="0"/>
+              </a:ext>
+            </a:extLst>
+          </a:blip>
+          <a:srcRect l="7070" t="10359" r="5413" b="4822"/>
+          <a:stretch/>
+        </p:blipFill>
+        <p:spPr bwMode="auto">
+          <a:xfrm>
+            <a:off x="9874743" y="4790782"/>
+            <a:ext cx="1887349" cy="606581"/>
+          </a:xfrm>
+          <a:prstGeom prst="rect">
+            <a:avLst/>
+          </a:prstGeom>
+          <a:noFill/>
+          <a:extLst>
+            <a:ext uri="{909E8E84-426E-40DD-AFC4-6F175D3DCCD1}">
+              <a14:hiddenFill xmlns:a14="http://schemas.microsoft.com/office/drawing/2010/main">
+                <a:solidFill>
+                  <a:srgbClr val="FFFFFF"/>
+                </a:solidFill>
+              </a14:hiddenFill>
+            </a:ext>
+          </a:extLst>
+        </p:spPr>
+      </p:pic>
+      <p:pic>
+        <p:nvPicPr>
+          <p:cNvPr id="1034" name="Picture 10" descr="Image result for gitkraken logo">
+            <a:extLst>
+              <a:ext uri="{FF2B5EF4-FFF2-40B4-BE49-F238E27FC236}">
+                <a16:creationId xmlns:a16="http://schemas.microsoft.com/office/drawing/2014/main" id="{271D0AAB-DFE0-4145-B5E5-FC898B03EAA1}"/>
+              </a:ext>
+            </a:extLst>
+          </p:cNvPr>
+          <p:cNvPicPr>
+            <a:picLocks noChangeAspect="1" noChangeArrowheads="1"/>
+          </p:cNvPicPr>
+          <p:nvPr/>
+        </p:nvPicPr>
+        <p:blipFill>
+          <a:blip r:embed="rId7">
+            <a:extLst>
+              <a:ext uri="{28A0092B-C50C-407E-A947-70E740481C1C}">
+                <a14:useLocalDpi xmlns:a14="http://schemas.microsoft.com/office/drawing/2010/main" val="0"/>
+              </a:ext>
+            </a:extLst>
+          </a:blip>
+          <a:srcRect/>
+          <a:stretch>
+            <a:fillRect/>
+          </a:stretch>
+        </p:blipFill>
+        <p:spPr bwMode="auto">
+          <a:xfrm>
+            <a:off x="10335188" y="5466763"/>
+            <a:ext cx="1005739" cy="1005739"/>
+          </a:xfrm>
+          <a:prstGeom prst="rect">
+            <a:avLst/>
+          </a:prstGeom>
+          <a:noFill/>
+          <a:extLst>
+            <a:ext uri="{909E8E84-426E-40DD-AFC4-6F175D3DCCD1}">
+              <a14:hiddenFill xmlns:a14="http://schemas.microsoft.com/office/drawing/2010/main">
+                <a:solidFill>
+                  <a:srgbClr val="FFFFFF"/>
+                </a:solidFill>
+              </a14:hiddenFill>
+            </a:ext>
+          </a:extLst>
+        </p:spPr>
+      </p:pic>
+      <p:sp>
+        <p:nvSpPr>
+          <p:cNvPr id="16" name="Rectangle: Rounded Corners 15">
+            <a:extLst>
+              <a:ext uri="{FF2B5EF4-FFF2-40B4-BE49-F238E27FC236}">
+                <a16:creationId xmlns:a16="http://schemas.microsoft.com/office/drawing/2014/main" id="{14B497D0-2328-4FE4-B2A3-81D3845514C5}"/>
+              </a:ext>
+            </a:extLst>
+          </p:cNvPr>
+          <p:cNvSpPr/>
+          <p:nvPr/>
+        </p:nvSpPr>
+        <p:spPr>
+          <a:xfrm>
+            <a:off x="1904979" y="312754"/>
+            <a:ext cx="10137219" cy="1817827"/>
+          </a:xfrm>
+          <a:prstGeom prst="roundRect">
+            <a:avLst/>
+          </a:prstGeom>
+          <a:noFill/>
+          <a:ln>
+            <a:solidFill>
+              <a:srgbClr val="3F51B5"/>
+            </a:solidFill>
+            <a:prstDash val="dash"/>
+          </a:ln>
+        </p:spPr>
+        <p:style>
+          <a:lnRef idx="2">
+            <a:schemeClr val="accent1">
+              <a:shade val="50000"/>
+            </a:schemeClr>
+          </a:lnRef>
+          <a:fillRef idx="1">
+            <a:schemeClr val="accent1"/>
+          </a:fillRef>
+          <a:effectRef idx="0">
+            <a:schemeClr val="accent1"/>
+          </a:effectRef>
+          <a:fontRef idx="minor">
+            <a:schemeClr val="lt1"/>
+          </a:fontRef>
+        </p:style>
+        <p:txBody>
+          <a:bodyPr rtlCol="0" anchor="ctr"/>
+          <a:lstStyle/>
+          <a:p>
+            <a:pPr algn="ctr"/>
+            <a:endParaRPr lang="en-US"/>
+          </a:p>
+        </p:txBody>
+      </p:sp>
+      <p:sp>
+        <p:nvSpPr>
+          <p:cNvPr id="27" name="Rectangle: Rounded Corners 26">
+            <a:extLst>
+              <a:ext uri="{FF2B5EF4-FFF2-40B4-BE49-F238E27FC236}">
+                <a16:creationId xmlns:a16="http://schemas.microsoft.com/office/drawing/2014/main" id="{3E3EC81A-B589-412F-8603-0877A3A627FE}"/>
+              </a:ext>
+            </a:extLst>
+          </p:cNvPr>
+          <p:cNvSpPr/>
+          <p:nvPr/>
+        </p:nvSpPr>
+        <p:spPr>
+          <a:xfrm>
+            <a:off x="1904998" y="2321321"/>
+            <a:ext cx="10137219" cy="1991693"/>
+          </a:xfrm>
+          <a:prstGeom prst="roundRect">
+            <a:avLst/>
+          </a:prstGeom>
+          <a:noFill/>
+          <a:ln>
+            <a:solidFill>
+              <a:srgbClr val="3F51B5"/>
+            </a:solidFill>
+            <a:prstDash val="dash"/>
+          </a:ln>
+        </p:spPr>
+        <p:style>
+          <a:lnRef idx="2">
+            <a:schemeClr val="accent1">
+              <a:shade val="50000"/>
+            </a:schemeClr>
+          </a:lnRef>
+          <a:fillRef idx="1">
+            <a:schemeClr val="accent1"/>
+          </a:fillRef>
+          <a:effectRef idx="0">
+            <a:schemeClr val="accent1"/>
+          </a:effectRef>
+          <a:fontRef idx="minor">
+            <a:schemeClr val="lt1"/>
+          </a:fontRef>
+        </p:style>
+        <p:txBody>
+          <a:bodyPr rtlCol="0" anchor="ctr"/>
+          <a:lstStyle/>
+          <a:p>
+            <a:pPr algn="ctr"/>
+            <a:endParaRPr lang="en-US" dirty="0"/>
+          </a:p>
+        </p:txBody>
+      </p:sp>
+      <p:sp>
+        <p:nvSpPr>
+          <p:cNvPr id="1024" name="TextBox 1023">
+            <a:extLst>
+              <a:ext uri="{FF2B5EF4-FFF2-40B4-BE49-F238E27FC236}">
+                <a16:creationId xmlns:a16="http://schemas.microsoft.com/office/drawing/2014/main" id="{31B024FE-EE37-49BB-A374-1738F28F2179}"/>
+              </a:ext>
+            </a:extLst>
+          </p:cNvPr>
+          <p:cNvSpPr txBox="1"/>
+          <p:nvPr/>
+        </p:nvSpPr>
+        <p:spPr>
+          <a:xfrm>
+            <a:off x="7428561" y="398142"/>
+            <a:ext cx="2248830" cy="369332"/>
+          </a:xfrm>
+          <a:prstGeom prst="rect">
+            <a:avLst/>
+          </a:prstGeom>
+          <a:noFill/>
+        </p:spPr>
+        <p:txBody>
+          <a:bodyPr wrap="square" rtlCol="0">
+            <a:spAutoFit/>
+          </a:bodyPr>
+          <a:lstStyle/>
+          <a:p>
+            <a:pPr algn="ctr"/>
+            <a:r>
+              <a:rPr lang="en-US" b="1" dirty="0"/>
+              <a:t>gmail.com</a:t>
+            </a:r>
+          </a:p>
+        </p:txBody>
+      </p:sp>
+      <p:sp>
+        <p:nvSpPr>
+          <p:cNvPr id="38" name="TextBox 37">
+            <a:extLst>
+              <a:ext uri="{FF2B5EF4-FFF2-40B4-BE49-F238E27FC236}">
+                <a16:creationId xmlns:a16="http://schemas.microsoft.com/office/drawing/2014/main" id="{825263F5-05B5-4E96-BBD4-B801A73A93CD}"/>
+              </a:ext>
+            </a:extLst>
+          </p:cNvPr>
+          <p:cNvSpPr txBox="1"/>
+          <p:nvPr/>
+        </p:nvSpPr>
+        <p:spPr>
+          <a:xfrm>
+            <a:off x="9677391" y="395303"/>
+            <a:ext cx="2364807" cy="369332"/>
+          </a:xfrm>
+          <a:prstGeom prst="rect">
+            <a:avLst/>
+          </a:prstGeom>
+          <a:noFill/>
+        </p:spPr>
+        <p:txBody>
+          <a:bodyPr wrap="square" rtlCol="0">
+            <a:spAutoFit/>
+          </a:bodyPr>
+          <a:lstStyle/>
+          <a:p>
+            <a:pPr algn="ctr"/>
+            <a:r>
+              <a:rPr lang="en-US" b="1" dirty="0"/>
+              <a:t>github.com</a:t>
+            </a:r>
+          </a:p>
+        </p:txBody>
+      </p:sp>
+      <p:sp>
+        <p:nvSpPr>
+          <p:cNvPr id="1025" name="Rectangle: Rounded Corners 1024">
+            <a:extLst>
+              <a:ext uri="{FF2B5EF4-FFF2-40B4-BE49-F238E27FC236}">
+                <a16:creationId xmlns:a16="http://schemas.microsoft.com/office/drawing/2014/main" id="{CBC49110-8BEF-47C6-B0B8-63E05F7D97F1}"/>
+              </a:ext>
+            </a:extLst>
+          </p:cNvPr>
+          <p:cNvSpPr/>
+          <p:nvPr/>
+        </p:nvSpPr>
+        <p:spPr>
+          <a:xfrm>
+            <a:off x="1904997" y="312754"/>
+            <a:ext cx="5523563" cy="1817828"/>
+          </a:xfrm>
+          <a:prstGeom prst="roundRect">
+            <a:avLst/>
+          </a:prstGeom>
+          <a:solidFill>
+            <a:schemeClr val="bg1"/>
+          </a:solidFill>
+          <a:ln>
+            <a:solidFill>
+              <a:srgbClr val="3F51B5"/>
+            </a:solidFill>
+          </a:ln>
+        </p:spPr>
+        <p:style>
+          <a:lnRef idx="2">
+            <a:schemeClr val="accent1">
+              <a:shade val="50000"/>
+            </a:schemeClr>
+          </a:lnRef>
+          <a:fillRef idx="1">
+            <a:schemeClr val="accent1"/>
+          </a:fillRef>
+          <a:effectRef idx="0">
+            <a:schemeClr val="accent1"/>
+          </a:effectRef>
+          <a:fontRef idx="minor">
+            <a:schemeClr val="lt1"/>
+          </a:fontRef>
+        </p:style>
+        <p:txBody>
+          <a:bodyPr rtlCol="0" anchor="ctr"/>
+          <a:lstStyle/>
+          <a:p>
+            <a:pPr marL="182563" indent="-182563">
+              <a:buFont typeface="Arial" panose="020B0604020202020204" pitchFamily="34" charset="0"/>
+              <a:buChar char="•"/>
+            </a:pPr>
+            <a:r>
+              <a:rPr lang="en-US" sz="2100" b="1" dirty="0">
+                <a:solidFill>
+                  <a:schemeClr val="tx1"/>
+                </a:solidFill>
+              </a:rPr>
+              <a:t>Gmail.com </a:t>
+            </a:r>
+            <a:r>
+              <a:rPr lang="en-US" sz="2100" dirty="0">
+                <a:solidFill>
+                  <a:schemeClr val="tx1"/>
+                </a:solidFill>
+              </a:rPr>
+              <a:t>is the biggest web host of e-mail.</a:t>
+            </a:r>
+          </a:p>
+          <a:p>
+            <a:pPr marL="182563" indent="-182563">
+              <a:buFont typeface="Arial" panose="020B0604020202020204" pitchFamily="34" charset="0"/>
+              <a:buChar char="•"/>
+            </a:pPr>
+            <a:r>
+              <a:rPr lang="en-US" sz="2100" b="1" dirty="0">
+                <a:solidFill>
+                  <a:schemeClr val="tx1"/>
+                </a:solidFill>
+              </a:rPr>
+              <a:t>GitHub.com </a:t>
+            </a:r>
+            <a:r>
+              <a:rPr lang="en-US" sz="2100" dirty="0">
+                <a:solidFill>
+                  <a:schemeClr val="tx1"/>
+                </a:solidFill>
+              </a:rPr>
+              <a:t>is the biggest web host of Git projects. </a:t>
+            </a:r>
+          </a:p>
+        </p:txBody>
+      </p:sp>
+      <p:sp>
+        <p:nvSpPr>
+          <p:cNvPr id="42" name="Rectangle: Rounded Corners 41">
+            <a:extLst>
+              <a:ext uri="{FF2B5EF4-FFF2-40B4-BE49-F238E27FC236}">
+                <a16:creationId xmlns:a16="http://schemas.microsoft.com/office/drawing/2014/main" id="{52719AC5-7973-4092-B284-74CA607E417F}"/>
+              </a:ext>
+            </a:extLst>
+          </p:cNvPr>
+          <p:cNvSpPr/>
+          <p:nvPr/>
+        </p:nvSpPr>
+        <p:spPr>
+          <a:xfrm>
+            <a:off x="1904979" y="2321321"/>
+            <a:ext cx="5523582" cy="1991693"/>
+          </a:xfrm>
+          <a:prstGeom prst="roundRect">
+            <a:avLst/>
+          </a:prstGeom>
+          <a:solidFill>
+            <a:schemeClr val="bg1"/>
+          </a:solidFill>
+          <a:ln>
+            <a:solidFill>
+              <a:srgbClr val="3F51B5"/>
+            </a:solidFill>
+          </a:ln>
+        </p:spPr>
+        <p:style>
+          <a:lnRef idx="2">
+            <a:schemeClr val="accent1">
+              <a:shade val="50000"/>
+            </a:schemeClr>
+          </a:lnRef>
+          <a:fillRef idx="1">
+            <a:schemeClr val="accent1"/>
+          </a:fillRef>
+          <a:effectRef idx="0">
+            <a:schemeClr val="accent1"/>
+          </a:effectRef>
+          <a:fontRef idx="minor">
+            <a:schemeClr val="lt1"/>
+          </a:fontRef>
+        </p:style>
+        <p:txBody>
+          <a:bodyPr rtlCol="0" anchor="ctr"/>
+          <a:lstStyle/>
+          <a:p>
+            <a:pPr marL="182563" indent="-182563">
+              <a:buFont typeface="Arial" panose="020B0604020202020204" pitchFamily="34" charset="0"/>
+              <a:buChar char="•"/>
+            </a:pPr>
+            <a:r>
+              <a:rPr lang="en-US" sz="2100" b="1" dirty="0">
+                <a:solidFill>
+                  <a:schemeClr val="tx1"/>
+                </a:solidFill>
+              </a:rPr>
+              <a:t>E-mail </a:t>
+            </a:r>
+            <a:r>
+              <a:rPr lang="en-US" sz="2100" dirty="0">
+                <a:solidFill>
+                  <a:schemeClr val="tx1"/>
+                </a:solidFill>
+              </a:rPr>
+              <a:t>is a protocol for sending letters online, it’s the same no matter which e-mail server you use</a:t>
+            </a:r>
+          </a:p>
+          <a:p>
+            <a:pPr marL="182563" indent="-182563">
+              <a:buFont typeface="Arial" panose="020B0604020202020204" pitchFamily="34" charset="0"/>
+              <a:buChar char="•"/>
+            </a:pPr>
+            <a:r>
+              <a:rPr lang="en-US" sz="2100" b="1" dirty="0">
+                <a:solidFill>
+                  <a:schemeClr val="tx1"/>
+                </a:solidFill>
+              </a:rPr>
+              <a:t>Git </a:t>
+            </a:r>
+            <a:r>
+              <a:rPr lang="en-US" sz="2100" dirty="0">
+                <a:solidFill>
+                  <a:schemeClr val="tx1"/>
+                </a:solidFill>
+              </a:rPr>
+              <a:t>is a protocol for sharing versions of your code, it’s the same thing on all Git servers</a:t>
+            </a:r>
+          </a:p>
+        </p:txBody>
+      </p:sp>
+      <p:sp>
+        <p:nvSpPr>
+          <p:cNvPr id="43" name="Rectangle: Rounded Corners 42">
+            <a:extLst>
+              <a:ext uri="{FF2B5EF4-FFF2-40B4-BE49-F238E27FC236}">
+                <a16:creationId xmlns:a16="http://schemas.microsoft.com/office/drawing/2014/main" id="{A1C14A0E-8A47-4DF1-8097-95F7A82C8311}"/>
+              </a:ext>
+            </a:extLst>
+          </p:cNvPr>
+          <p:cNvSpPr/>
+          <p:nvPr/>
+        </p:nvSpPr>
+        <p:spPr>
+          <a:xfrm>
+            <a:off x="451337" y="4503755"/>
+            <a:ext cx="11590882" cy="2068434"/>
+          </a:xfrm>
+          <a:prstGeom prst="roundRect">
+            <a:avLst/>
+          </a:prstGeom>
+          <a:noFill/>
+          <a:ln>
+            <a:solidFill>
+              <a:srgbClr val="3F51B5"/>
+            </a:solidFill>
+            <a:prstDash val="dash"/>
+          </a:ln>
+        </p:spPr>
+        <p:style>
+          <a:lnRef idx="2">
+            <a:schemeClr val="accent1">
+              <a:shade val="50000"/>
+            </a:schemeClr>
+          </a:lnRef>
+          <a:fillRef idx="1">
+            <a:schemeClr val="accent1"/>
+          </a:fillRef>
+          <a:effectRef idx="0">
+            <a:schemeClr val="accent1"/>
+          </a:effectRef>
+          <a:fontRef idx="minor">
+            <a:schemeClr val="lt1"/>
+          </a:fontRef>
+        </p:style>
+        <p:txBody>
+          <a:bodyPr rtlCol="0" anchor="ctr"/>
+          <a:lstStyle/>
+          <a:p>
+            <a:pPr algn="ctr"/>
+            <a:endParaRPr lang="en-US" dirty="0"/>
+          </a:p>
+        </p:txBody>
+      </p:sp>
+      <p:sp>
+        <p:nvSpPr>
+          <p:cNvPr id="44" name="Rectangle: Rounded Corners 43">
+            <a:extLst>
+              <a:ext uri="{FF2B5EF4-FFF2-40B4-BE49-F238E27FC236}">
+                <a16:creationId xmlns:a16="http://schemas.microsoft.com/office/drawing/2014/main" id="{341C4D75-7306-4A89-BAFD-7307BA2EB7AE}"/>
+              </a:ext>
+            </a:extLst>
+          </p:cNvPr>
+          <p:cNvSpPr/>
+          <p:nvPr/>
+        </p:nvSpPr>
+        <p:spPr>
+          <a:xfrm>
+            <a:off x="1904978" y="4503755"/>
+            <a:ext cx="5523581" cy="2068434"/>
+          </a:xfrm>
+          <a:prstGeom prst="roundRect">
+            <a:avLst/>
+          </a:prstGeom>
+          <a:solidFill>
+            <a:schemeClr val="bg1"/>
+          </a:solidFill>
+          <a:ln>
+            <a:solidFill>
+              <a:srgbClr val="3F51B5"/>
+            </a:solidFill>
+          </a:ln>
+        </p:spPr>
+        <p:style>
+          <a:lnRef idx="2">
+            <a:schemeClr val="accent1">
+              <a:shade val="50000"/>
+            </a:schemeClr>
+          </a:lnRef>
+          <a:fillRef idx="1">
+            <a:schemeClr val="accent1"/>
+          </a:fillRef>
+          <a:effectRef idx="0">
+            <a:schemeClr val="accent1"/>
+          </a:effectRef>
+          <a:fontRef idx="minor">
+            <a:schemeClr val="lt1"/>
+          </a:fontRef>
+        </p:style>
+        <p:txBody>
+          <a:bodyPr rtlCol="0" anchor="ctr"/>
+          <a:lstStyle/>
+          <a:p>
+            <a:pPr marL="182563" indent="-182563">
+              <a:buFont typeface="Arial" panose="020B0604020202020204" pitchFamily="34" charset="0"/>
+              <a:buChar char="•"/>
+            </a:pPr>
+            <a:r>
+              <a:rPr lang="en-US" sz="2100" dirty="0">
+                <a:solidFill>
+                  <a:schemeClr val="tx1"/>
+                </a:solidFill>
+              </a:rPr>
+              <a:t>An </a:t>
+            </a:r>
+            <a:r>
+              <a:rPr lang="en-US" sz="2100" b="1" dirty="0">
+                <a:solidFill>
+                  <a:schemeClr val="tx1"/>
+                </a:solidFill>
+              </a:rPr>
+              <a:t>e-mail client </a:t>
+            </a:r>
+            <a:r>
+              <a:rPr lang="en-US" sz="2100" dirty="0">
+                <a:solidFill>
+                  <a:schemeClr val="tx1"/>
+                </a:solidFill>
+              </a:rPr>
+              <a:t>is a desktop application that gives you easy access to features on your mail server</a:t>
+            </a:r>
+          </a:p>
+          <a:p>
+            <a:pPr marL="182563" indent="-182563">
+              <a:buFont typeface="Arial" panose="020B0604020202020204" pitchFamily="34" charset="0"/>
+              <a:buChar char="•"/>
+            </a:pPr>
+            <a:r>
+              <a:rPr lang="en-US" sz="2100" dirty="0">
+                <a:solidFill>
+                  <a:schemeClr val="tx1"/>
+                </a:solidFill>
+              </a:rPr>
+              <a:t>A </a:t>
+            </a:r>
+            <a:r>
+              <a:rPr lang="en-US" sz="2100" b="1" dirty="0">
+                <a:solidFill>
+                  <a:schemeClr val="tx1"/>
+                </a:solidFill>
+              </a:rPr>
+              <a:t>git client </a:t>
+            </a:r>
+            <a:r>
+              <a:rPr lang="en-US" sz="2100" dirty="0">
+                <a:solidFill>
+                  <a:schemeClr val="tx1"/>
+                </a:solidFill>
+              </a:rPr>
+              <a:t>is a desktop application that gives you easy access to features on your git server</a:t>
+            </a:r>
+          </a:p>
+        </p:txBody>
+      </p:sp>
+      <p:sp>
+        <p:nvSpPr>
+          <p:cNvPr id="1029" name="TextBox 1028">
+            <a:extLst>
+              <a:ext uri="{FF2B5EF4-FFF2-40B4-BE49-F238E27FC236}">
+                <a16:creationId xmlns:a16="http://schemas.microsoft.com/office/drawing/2014/main" id="{0F909E12-CBA1-48D5-B315-CC797D0CC391}"/>
+              </a:ext>
+            </a:extLst>
+          </p:cNvPr>
+          <p:cNvSpPr txBox="1"/>
+          <p:nvPr/>
+        </p:nvSpPr>
+        <p:spPr>
+          <a:xfrm>
+            <a:off x="8114570" y="2994003"/>
+            <a:ext cx="1144434" cy="646331"/>
+          </a:xfrm>
+          <a:prstGeom prst="rect">
+            <a:avLst/>
+          </a:prstGeom>
+          <a:noFill/>
+        </p:spPr>
+        <p:txBody>
+          <a:bodyPr wrap="square" rtlCol="0">
+            <a:spAutoFit/>
+          </a:bodyPr>
+          <a:lstStyle/>
+          <a:p>
+            <a:pPr algn="ctr"/>
+            <a:r>
+              <a:rPr lang="en-US" dirty="0"/>
+              <a:t>E-mail Protocol</a:t>
+            </a:r>
+          </a:p>
+        </p:txBody>
+      </p:sp>
+      <p:sp>
+        <p:nvSpPr>
+          <p:cNvPr id="47" name="TextBox 46">
+            <a:extLst>
+              <a:ext uri="{FF2B5EF4-FFF2-40B4-BE49-F238E27FC236}">
+                <a16:creationId xmlns:a16="http://schemas.microsoft.com/office/drawing/2014/main" id="{44639CA1-7BCE-4558-A8D3-61BD69612C08}"/>
+              </a:ext>
+            </a:extLst>
+          </p:cNvPr>
+          <p:cNvSpPr txBox="1"/>
+          <p:nvPr/>
+        </p:nvSpPr>
+        <p:spPr>
+          <a:xfrm>
+            <a:off x="10599456" y="2994001"/>
+            <a:ext cx="1144434" cy="646331"/>
+          </a:xfrm>
+          <a:prstGeom prst="rect">
+            <a:avLst/>
+          </a:prstGeom>
+          <a:noFill/>
+        </p:spPr>
+        <p:txBody>
+          <a:bodyPr wrap="square" rtlCol="0">
+            <a:spAutoFit/>
+          </a:bodyPr>
+          <a:lstStyle/>
+          <a:p>
+            <a:pPr algn="ctr"/>
+            <a:r>
+              <a:rPr lang="en-US" dirty="0"/>
+              <a:t>Git</a:t>
+            </a:r>
+          </a:p>
+          <a:p>
+            <a:pPr algn="ctr"/>
+            <a:r>
+              <a:rPr lang="en-US" dirty="0"/>
+              <a:t>Protocol</a:t>
+            </a:r>
+          </a:p>
+        </p:txBody>
+      </p:sp>
       <p:cxnSp>
         <p:nvCxnSpPr>
           <p:cNvPr id="19" name="Straight Arrow Connector 18">
@@ -2962,8 +3859,8 @@
         </p:nvCxnSpPr>
         <p:spPr>
           <a:xfrm>
-            <a:off x="7848600" y="2133600"/>
-            <a:ext cx="0" cy="2590800"/>
+            <a:off x="7848600" y="1954194"/>
+            <a:ext cx="0" cy="2770206"/>
           </a:xfrm>
           <a:prstGeom prst="straightConnector1">
             <a:avLst/>
@@ -3007,8 +3904,1954 @@
         </p:nvCxnSpPr>
         <p:spPr>
           <a:xfrm flipH="1">
-            <a:off x="10330566" y="2130582"/>
-            <a:ext cx="1" cy="2590800"/>
+            <a:off x="10330567" y="1966615"/>
+            <a:ext cx="4621" cy="2754767"/>
+          </a:xfrm>
+          <a:prstGeom prst="straightConnector1">
+            <a:avLst/>
+          </a:prstGeom>
+          <a:ln w="38100">
+            <a:solidFill>
+              <a:srgbClr val="002060"/>
+            </a:solidFill>
+            <a:headEnd type="triangle"/>
+            <a:tailEnd type="triangle"/>
+          </a:ln>
+        </p:spPr>
+        <p:style>
+          <a:lnRef idx="1">
+            <a:schemeClr val="accent1"/>
+          </a:lnRef>
+          <a:fillRef idx="0">
+            <a:schemeClr val="accent1"/>
+          </a:fillRef>
+          <a:effectRef idx="0">
+            <a:schemeClr val="accent1"/>
+          </a:effectRef>
+          <a:fontRef idx="minor">
+            <a:schemeClr val="tx1"/>
+          </a:fontRef>
+        </p:style>
+      </p:cxnSp>
+    </p:spTree>
+    <p:extLst>
+      <p:ext uri="{BB962C8B-B14F-4D97-AF65-F5344CB8AC3E}">
+        <p14:creationId xmlns:p14="http://schemas.microsoft.com/office/powerpoint/2010/main" val="1213075210"/>
+      </p:ext>
+    </p:extLst>
+  </p:cSld>
+  <p:clrMapOvr>
+    <a:masterClrMapping/>
+  </p:clrMapOvr>
+</p:sld>
+</file>
+
+<file path=ppt/slides/slide2.xml><?xml version="1.0" encoding="utf-8"?>
+<p:sld xmlns:a="http://schemas.openxmlformats.org/drawingml/2006/main" xmlns:r="http://schemas.openxmlformats.org/officeDocument/2006/relationships" xmlns:p="http://schemas.openxmlformats.org/presentationml/2006/main">
+  <p:cSld>
+    <p:bg>
+      <p:bgPr>
+        <a:solidFill>
+          <a:schemeClr val="bg1">
+            <a:alpha val="0"/>
+          </a:schemeClr>
+        </a:solidFill>
+        <a:effectLst/>
+      </p:bgPr>
+    </p:bg>
+    <p:spTree>
+      <p:nvGrpSpPr>
+        <p:cNvPr id="1" name=""/>
+        <p:cNvGrpSpPr/>
+        <p:nvPr/>
+      </p:nvGrpSpPr>
+      <p:grpSpPr>
+        <a:xfrm>
+          <a:off x="0" y="0"/>
+          <a:ext cx="0" cy="0"/>
+          <a:chOff x="0" y="0"/>
+          <a:chExt cx="0" cy="0"/>
+        </a:xfrm>
+      </p:grpSpPr>
+      <p:sp>
+        <p:nvSpPr>
+          <p:cNvPr id="27" name="Rectangle: Rounded Corners 26">
+            <a:extLst>
+              <a:ext uri="{FF2B5EF4-FFF2-40B4-BE49-F238E27FC236}">
+                <a16:creationId xmlns:a16="http://schemas.microsoft.com/office/drawing/2014/main" id="{3E3EC81A-B589-412F-8603-0877A3A627FE}"/>
+              </a:ext>
+            </a:extLst>
+          </p:cNvPr>
+          <p:cNvSpPr/>
+          <p:nvPr/>
+        </p:nvSpPr>
+        <p:spPr>
+          <a:xfrm>
+            <a:off x="448110" y="2321321"/>
+            <a:ext cx="11594107" cy="1991693"/>
+          </a:xfrm>
+          <a:prstGeom prst="roundRect">
+            <a:avLst/>
+          </a:prstGeom>
+          <a:solidFill>
+            <a:schemeClr val="bg1"/>
+          </a:solidFill>
+          <a:ln>
+            <a:solidFill>
+              <a:srgbClr val="3F51B5"/>
+            </a:solidFill>
+            <a:prstDash val="dash"/>
+          </a:ln>
+        </p:spPr>
+        <p:style>
+          <a:lnRef idx="2">
+            <a:schemeClr val="accent1">
+              <a:shade val="50000"/>
+            </a:schemeClr>
+          </a:lnRef>
+          <a:fillRef idx="1">
+            <a:schemeClr val="accent1"/>
+          </a:fillRef>
+          <a:effectRef idx="0">
+            <a:schemeClr val="accent1"/>
+          </a:effectRef>
+          <a:fontRef idx="minor">
+            <a:schemeClr val="lt1"/>
+          </a:fontRef>
+        </p:style>
+        <p:txBody>
+          <a:bodyPr rtlCol="0" anchor="ctr"/>
+          <a:lstStyle/>
+          <a:p>
+            <a:pPr algn="ctr"/>
+            <a:endParaRPr lang="en-US" dirty="0"/>
+          </a:p>
+        </p:txBody>
+      </p:sp>
+      <p:sp>
+        <p:nvSpPr>
+          <p:cNvPr id="22" name="Rectangle: Rounded Corners 21">
+            <a:extLst>
+              <a:ext uri="{FF2B5EF4-FFF2-40B4-BE49-F238E27FC236}">
+                <a16:creationId xmlns:a16="http://schemas.microsoft.com/office/drawing/2014/main" id="{7ACF9D3B-13EA-45FB-BA10-2BB7ED86EA3D}"/>
+              </a:ext>
+            </a:extLst>
+          </p:cNvPr>
+          <p:cNvSpPr/>
+          <p:nvPr/>
+        </p:nvSpPr>
+        <p:spPr>
+          <a:xfrm>
+            <a:off x="451336" y="2321322"/>
+            <a:ext cx="2291849" cy="1991691"/>
+          </a:xfrm>
+          <a:prstGeom prst="roundRect">
+            <a:avLst/>
+          </a:prstGeom>
+          <a:noFill/>
+          <a:ln>
+            <a:solidFill>
+              <a:srgbClr val="3F51B5"/>
+            </a:solidFill>
+          </a:ln>
+        </p:spPr>
+        <p:style>
+          <a:lnRef idx="2">
+            <a:schemeClr val="accent1">
+              <a:shade val="50000"/>
+            </a:schemeClr>
+          </a:lnRef>
+          <a:fillRef idx="1">
+            <a:schemeClr val="accent1"/>
+          </a:fillRef>
+          <a:effectRef idx="0">
+            <a:schemeClr val="accent1"/>
+          </a:effectRef>
+          <a:fontRef idx="minor">
+            <a:schemeClr val="lt1"/>
+          </a:fontRef>
+        </p:style>
+        <p:txBody>
+          <a:bodyPr rtlCol="0" anchor="ctr"/>
+          <a:lstStyle/>
+          <a:p>
+            <a:r>
+              <a:rPr lang="en-US" sz="3200" dirty="0">
+                <a:solidFill>
+                  <a:schemeClr val="tx1"/>
+                </a:solidFill>
+              </a:rPr>
+              <a:t>Git</a:t>
+            </a:r>
+          </a:p>
+        </p:txBody>
+      </p:sp>
+      <p:sp>
+        <p:nvSpPr>
+          <p:cNvPr id="42" name="Rectangle: Rounded Corners 41">
+            <a:extLst>
+              <a:ext uri="{FF2B5EF4-FFF2-40B4-BE49-F238E27FC236}">
+                <a16:creationId xmlns:a16="http://schemas.microsoft.com/office/drawing/2014/main" id="{52719AC5-7973-4092-B284-74CA607E417F}"/>
+              </a:ext>
+            </a:extLst>
+          </p:cNvPr>
+          <p:cNvSpPr/>
+          <p:nvPr/>
+        </p:nvSpPr>
+        <p:spPr>
+          <a:xfrm>
+            <a:off x="1904979" y="2321321"/>
+            <a:ext cx="5523582" cy="1991693"/>
+          </a:xfrm>
+          <a:prstGeom prst="roundRect">
+            <a:avLst/>
+          </a:prstGeom>
+          <a:solidFill>
+            <a:schemeClr val="bg1"/>
+          </a:solidFill>
+          <a:ln>
+            <a:solidFill>
+              <a:srgbClr val="3F51B5"/>
+            </a:solidFill>
+          </a:ln>
+        </p:spPr>
+        <p:style>
+          <a:lnRef idx="2">
+            <a:schemeClr val="accent1">
+              <a:shade val="50000"/>
+            </a:schemeClr>
+          </a:lnRef>
+          <a:fillRef idx="1">
+            <a:schemeClr val="accent1"/>
+          </a:fillRef>
+          <a:effectRef idx="0">
+            <a:schemeClr val="accent1"/>
+          </a:effectRef>
+          <a:fontRef idx="minor">
+            <a:schemeClr val="lt1"/>
+          </a:fontRef>
+        </p:style>
+        <p:txBody>
+          <a:bodyPr rtlCol="0" anchor="ctr"/>
+          <a:lstStyle/>
+          <a:p>
+            <a:pPr marL="182563" indent="-182563">
+              <a:buFont typeface="Arial" panose="020B0604020202020204" pitchFamily="34" charset="0"/>
+              <a:buChar char="•"/>
+            </a:pPr>
+            <a:r>
+              <a:rPr lang="en-US" sz="2100" b="1" dirty="0">
+                <a:solidFill>
+                  <a:schemeClr val="tx1"/>
+                </a:solidFill>
+              </a:rPr>
+              <a:t>E-mail </a:t>
+            </a:r>
+            <a:r>
+              <a:rPr lang="en-US" sz="2100" dirty="0">
+                <a:solidFill>
+                  <a:schemeClr val="tx1"/>
+                </a:solidFill>
+              </a:rPr>
+              <a:t>is a protocol for sending letters online, it’s the same no matter which e-mail server you use</a:t>
+            </a:r>
+          </a:p>
+          <a:p>
+            <a:pPr marL="182563" indent="-182563">
+              <a:buFont typeface="Arial" panose="020B0604020202020204" pitchFamily="34" charset="0"/>
+              <a:buChar char="•"/>
+            </a:pPr>
+            <a:r>
+              <a:rPr lang="en-US" sz="2100" b="1" dirty="0">
+                <a:solidFill>
+                  <a:schemeClr val="tx1"/>
+                </a:solidFill>
+              </a:rPr>
+              <a:t>Git </a:t>
+            </a:r>
+            <a:r>
+              <a:rPr lang="en-US" sz="2100" dirty="0">
+                <a:solidFill>
+                  <a:schemeClr val="tx1"/>
+                </a:solidFill>
+              </a:rPr>
+              <a:t>is a protocol for sharing versions of your code, it’s the same thing on all Git servers</a:t>
+            </a:r>
+          </a:p>
+        </p:txBody>
+      </p:sp>
+      <p:sp>
+        <p:nvSpPr>
+          <p:cNvPr id="1029" name="TextBox 1028">
+            <a:extLst>
+              <a:ext uri="{FF2B5EF4-FFF2-40B4-BE49-F238E27FC236}">
+                <a16:creationId xmlns:a16="http://schemas.microsoft.com/office/drawing/2014/main" id="{0F909E12-CBA1-48D5-B315-CC797D0CC391}"/>
+              </a:ext>
+            </a:extLst>
+          </p:cNvPr>
+          <p:cNvSpPr txBox="1"/>
+          <p:nvPr/>
+        </p:nvSpPr>
+        <p:spPr>
+          <a:xfrm>
+            <a:off x="8114570" y="2994003"/>
+            <a:ext cx="1144434" cy="646331"/>
+          </a:xfrm>
+          <a:prstGeom prst="rect">
+            <a:avLst/>
+          </a:prstGeom>
+          <a:noFill/>
+        </p:spPr>
+        <p:txBody>
+          <a:bodyPr wrap="square" rtlCol="0">
+            <a:spAutoFit/>
+          </a:bodyPr>
+          <a:lstStyle/>
+          <a:p>
+            <a:pPr algn="ctr"/>
+            <a:r>
+              <a:rPr lang="en-US" dirty="0"/>
+              <a:t>E-mail Protocol</a:t>
+            </a:r>
+          </a:p>
+        </p:txBody>
+      </p:sp>
+      <p:sp>
+        <p:nvSpPr>
+          <p:cNvPr id="47" name="TextBox 46">
+            <a:extLst>
+              <a:ext uri="{FF2B5EF4-FFF2-40B4-BE49-F238E27FC236}">
+                <a16:creationId xmlns:a16="http://schemas.microsoft.com/office/drawing/2014/main" id="{44639CA1-7BCE-4558-A8D3-61BD69612C08}"/>
+              </a:ext>
+            </a:extLst>
+          </p:cNvPr>
+          <p:cNvSpPr txBox="1"/>
+          <p:nvPr/>
+        </p:nvSpPr>
+        <p:spPr>
+          <a:xfrm>
+            <a:off x="10599456" y="2994001"/>
+            <a:ext cx="1144434" cy="646331"/>
+          </a:xfrm>
+          <a:prstGeom prst="rect">
+            <a:avLst/>
+          </a:prstGeom>
+          <a:noFill/>
+        </p:spPr>
+        <p:txBody>
+          <a:bodyPr wrap="square" rtlCol="0">
+            <a:spAutoFit/>
+          </a:bodyPr>
+          <a:lstStyle/>
+          <a:p>
+            <a:pPr algn="ctr"/>
+            <a:r>
+              <a:rPr lang="en-US" dirty="0"/>
+              <a:t>Git</a:t>
+            </a:r>
+          </a:p>
+          <a:p>
+            <a:pPr algn="ctr"/>
+            <a:r>
+              <a:rPr lang="en-US" dirty="0"/>
+              <a:t>Protocol</a:t>
+            </a:r>
+          </a:p>
+        </p:txBody>
+      </p:sp>
+      <p:cxnSp>
+        <p:nvCxnSpPr>
+          <p:cNvPr id="6" name="Straight Connector 5">
+            <a:extLst>
+              <a:ext uri="{FF2B5EF4-FFF2-40B4-BE49-F238E27FC236}">
+                <a16:creationId xmlns:a16="http://schemas.microsoft.com/office/drawing/2014/main" id="{F5DCE89E-9E87-487B-81F6-AA32D088C773}"/>
+              </a:ext>
+            </a:extLst>
+          </p:cNvPr>
+          <p:cNvCxnSpPr>
+            <a:cxnSpLocks/>
+          </p:cNvCxnSpPr>
+          <p:nvPr/>
+        </p:nvCxnSpPr>
+        <p:spPr>
+          <a:xfrm>
+            <a:off x="9677400" y="158968"/>
+            <a:ext cx="0" cy="6546632"/>
+          </a:xfrm>
+          <a:prstGeom prst="line">
+            <a:avLst/>
+          </a:prstGeom>
+          <a:ln w="28575">
+            <a:solidFill>
+              <a:schemeClr val="tx1">
+                <a:lumMod val="85000"/>
+                <a:lumOff val="15000"/>
+              </a:schemeClr>
+            </a:solidFill>
+          </a:ln>
+        </p:spPr>
+        <p:style>
+          <a:lnRef idx="1">
+            <a:schemeClr val="accent1"/>
+          </a:lnRef>
+          <a:fillRef idx="0">
+            <a:schemeClr val="accent1"/>
+          </a:fillRef>
+          <a:effectRef idx="0">
+            <a:schemeClr val="accent1"/>
+          </a:effectRef>
+          <a:fontRef idx="minor">
+            <a:schemeClr val="tx1"/>
+          </a:fontRef>
+        </p:style>
+      </p:cxnSp>
+      <p:cxnSp>
+        <p:nvCxnSpPr>
+          <p:cNvPr id="19" name="Straight Arrow Connector 18">
+            <a:extLst>
+              <a:ext uri="{FF2B5EF4-FFF2-40B4-BE49-F238E27FC236}">
+                <a16:creationId xmlns:a16="http://schemas.microsoft.com/office/drawing/2014/main" id="{0DD20820-B1C1-4F4C-BE98-74B6AB02DA60}"/>
+              </a:ext>
+            </a:extLst>
+          </p:cNvPr>
+          <p:cNvCxnSpPr>
+            <a:cxnSpLocks/>
+          </p:cNvCxnSpPr>
+          <p:nvPr/>
+        </p:nvCxnSpPr>
+        <p:spPr>
+          <a:xfrm>
+            <a:off x="7848600" y="1954194"/>
+            <a:ext cx="0" cy="2770206"/>
+          </a:xfrm>
+          <a:prstGeom prst="straightConnector1">
+            <a:avLst/>
+          </a:prstGeom>
+          <a:ln w="38100">
+            <a:solidFill>
+              <a:srgbClr val="002060"/>
+            </a:solidFill>
+            <a:headEnd type="triangle"/>
+            <a:tailEnd type="triangle"/>
+          </a:ln>
+        </p:spPr>
+        <p:style>
+          <a:lnRef idx="1">
+            <a:schemeClr val="accent1"/>
+          </a:lnRef>
+          <a:fillRef idx="0">
+            <a:schemeClr val="accent1"/>
+          </a:fillRef>
+          <a:effectRef idx="0">
+            <a:schemeClr val="accent1"/>
+          </a:effectRef>
+          <a:fontRef idx="minor">
+            <a:schemeClr val="tx1"/>
+          </a:fontRef>
+        </p:style>
+      </p:cxnSp>
+      <p:cxnSp>
+        <p:nvCxnSpPr>
+          <p:cNvPr id="20" name="Straight Arrow Connector 19">
+            <a:extLst>
+              <a:ext uri="{FF2B5EF4-FFF2-40B4-BE49-F238E27FC236}">
+                <a16:creationId xmlns:a16="http://schemas.microsoft.com/office/drawing/2014/main" id="{27CB6290-5A4F-45F0-A6EE-ADA36E5A2D0A}"/>
+              </a:ext>
+            </a:extLst>
+          </p:cNvPr>
+          <p:cNvCxnSpPr>
+            <a:cxnSpLocks/>
+          </p:cNvCxnSpPr>
+          <p:nvPr/>
+        </p:nvCxnSpPr>
+        <p:spPr>
+          <a:xfrm flipH="1">
+            <a:off x="10330567" y="1966615"/>
+            <a:ext cx="4621" cy="2754767"/>
+          </a:xfrm>
+          <a:prstGeom prst="straightConnector1">
+            <a:avLst/>
+          </a:prstGeom>
+          <a:ln w="38100">
+            <a:solidFill>
+              <a:srgbClr val="002060"/>
+            </a:solidFill>
+            <a:headEnd type="triangle"/>
+            <a:tailEnd type="triangle"/>
+          </a:ln>
+        </p:spPr>
+        <p:style>
+          <a:lnRef idx="1">
+            <a:schemeClr val="accent1"/>
+          </a:lnRef>
+          <a:fillRef idx="0">
+            <a:schemeClr val="accent1"/>
+          </a:fillRef>
+          <a:effectRef idx="0">
+            <a:schemeClr val="accent1"/>
+          </a:effectRef>
+          <a:fontRef idx="minor">
+            <a:schemeClr val="tx1"/>
+          </a:fontRef>
+        </p:style>
+      </p:cxnSp>
+    </p:spTree>
+    <p:extLst>
+      <p:ext uri="{BB962C8B-B14F-4D97-AF65-F5344CB8AC3E}">
+        <p14:creationId xmlns:p14="http://schemas.microsoft.com/office/powerpoint/2010/main" val="3040058590"/>
+      </p:ext>
+    </p:extLst>
+  </p:cSld>
+  <p:clrMapOvr>
+    <a:masterClrMapping/>
+  </p:clrMapOvr>
+</p:sld>
+</file>
+
+<file path=ppt/slides/slide3.xml><?xml version="1.0" encoding="utf-8"?>
+<p:sld xmlns:a="http://schemas.openxmlformats.org/drawingml/2006/main" xmlns:r="http://schemas.openxmlformats.org/officeDocument/2006/relationships" xmlns:p="http://schemas.openxmlformats.org/presentationml/2006/main">
+  <p:cSld>
+    <p:bg>
+      <p:bgPr>
+        <a:solidFill>
+          <a:schemeClr val="bg1">
+            <a:alpha val="0"/>
+          </a:schemeClr>
+        </a:solidFill>
+        <a:effectLst/>
+      </p:bgPr>
+    </p:bg>
+    <p:spTree>
+      <p:nvGrpSpPr>
+        <p:cNvPr id="1" name=""/>
+        <p:cNvGrpSpPr/>
+        <p:nvPr/>
+      </p:nvGrpSpPr>
+      <p:grpSpPr>
+        <a:xfrm>
+          <a:off x="0" y="0"/>
+          <a:ext cx="0" cy="0"/>
+          <a:chOff x="0" y="0"/>
+          <a:chExt cx="0" cy="0"/>
+        </a:xfrm>
+      </p:grpSpPr>
+      <p:sp>
+        <p:nvSpPr>
+          <p:cNvPr id="16" name="Rectangle: Rounded Corners 15">
+            <a:extLst>
+              <a:ext uri="{FF2B5EF4-FFF2-40B4-BE49-F238E27FC236}">
+                <a16:creationId xmlns:a16="http://schemas.microsoft.com/office/drawing/2014/main" id="{14B497D0-2328-4FE4-B2A3-81D3845514C5}"/>
+              </a:ext>
+            </a:extLst>
+          </p:cNvPr>
+          <p:cNvSpPr/>
+          <p:nvPr/>
+        </p:nvSpPr>
+        <p:spPr>
+          <a:xfrm>
+            <a:off x="448093" y="312754"/>
+            <a:ext cx="11594106" cy="1817827"/>
+          </a:xfrm>
+          <a:prstGeom prst="roundRect">
+            <a:avLst/>
+          </a:prstGeom>
+          <a:solidFill>
+            <a:schemeClr val="bg1"/>
+          </a:solidFill>
+          <a:ln>
+            <a:solidFill>
+              <a:srgbClr val="3F51B5"/>
+            </a:solidFill>
+            <a:prstDash val="dash"/>
+          </a:ln>
+        </p:spPr>
+        <p:style>
+          <a:lnRef idx="2">
+            <a:schemeClr val="accent1">
+              <a:shade val="50000"/>
+            </a:schemeClr>
+          </a:lnRef>
+          <a:fillRef idx="1">
+            <a:schemeClr val="accent1"/>
+          </a:fillRef>
+          <a:effectRef idx="0">
+            <a:schemeClr val="accent1"/>
+          </a:effectRef>
+          <a:fontRef idx="minor">
+            <a:schemeClr val="lt1"/>
+          </a:fontRef>
+        </p:style>
+        <p:txBody>
+          <a:bodyPr rtlCol="0" anchor="ctr"/>
+          <a:lstStyle/>
+          <a:p>
+            <a:pPr algn="ctr"/>
+            <a:endParaRPr lang="en-US"/>
+          </a:p>
+        </p:txBody>
+      </p:sp>
+      <p:sp>
+        <p:nvSpPr>
+          <p:cNvPr id="27" name="Rectangle: Rounded Corners 26">
+            <a:extLst>
+              <a:ext uri="{FF2B5EF4-FFF2-40B4-BE49-F238E27FC236}">
+                <a16:creationId xmlns:a16="http://schemas.microsoft.com/office/drawing/2014/main" id="{3E3EC81A-B589-412F-8603-0877A3A627FE}"/>
+              </a:ext>
+            </a:extLst>
+          </p:cNvPr>
+          <p:cNvSpPr/>
+          <p:nvPr/>
+        </p:nvSpPr>
+        <p:spPr>
+          <a:xfrm>
+            <a:off x="448110" y="2321321"/>
+            <a:ext cx="11594107" cy="1991693"/>
+          </a:xfrm>
+          <a:prstGeom prst="roundRect">
+            <a:avLst/>
+          </a:prstGeom>
+          <a:solidFill>
+            <a:schemeClr val="bg1"/>
+          </a:solidFill>
+          <a:ln>
+            <a:solidFill>
+              <a:srgbClr val="3F51B5"/>
+            </a:solidFill>
+            <a:prstDash val="dash"/>
+          </a:ln>
+        </p:spPr>
+        <p:style>
+          <a:lnRef idx="2">
+            <a:schemeClr val="accent1">
+              <a:shade val="50000"/>
+            </a:schemeClr>
+          </a:lnRef>
+          <a:fillRef idx="1">
+            <a:schemeClr val="accent1"/>
+          </a:fillRef>
+          <a:effectRef idx="0">
+            <a:schemeClr val="accent1"/>
+          </a:effectRef>
+          <a:fontRef idx="minor">
+            <a:schemeClr val="lt1"/>
+          </a:fontRef>
+        </p:style>
+        <p:txBody>
+          <a:bodyPr rtlCol="0" anchor="ctr"/>
+          <a:lstStyle/>
+          <a:p>
+            <a:pPr algn="ctr"/>
+            <a:endParaRPr lang="en-US" dirty="0"/>
+          </a:p>
+        </p:txBody>
+      </p:sp>
+      <p:sp>
+        <p:nvSpPr>
+          <p:cNvPr id="23" name="Rectangle: Rounded Corners 22">
+            <a:extLst>
+              <a:ext uri="{FF2B5EF4-FFF2-40B4-BE49-F238E27FC236}">
+                <a16:creationId xmlns:a16="http://schemas.microsoft.com/office/drawing/2014/main" id="{2C1879ED-87D0-425F-84A1-D4F0BDB35DE2}"/>
+              </a:ext>
+            </a:extLst>
+          </p:cNvPr>
+          <p:cNvSpPr/>
+          <p:nvPr/>
+        </p:nvSpPr>
+        <p:spPr>
+          <a:xfrm>
+            <a:off x="451336" y="312754"/>
+            <a:ext cx="2291863" cy="1817828"/>
+          </a:xfrm>
+          <a:prstGeom prst="roundRect">
+            <a:avLst/>
+          </a:prstGeom>
+          <a:noFill/>
+          <a:ln>
+            <a:solidFill>
+              <a:srgbClr val="3F51B5"/>
+            </a:solidFill>
+          </a:ln>
+        </p:spPr>
+        <p:style>
+          <a:lnRef idx="2">
+            <a:schemeClr val="accent1">
+              <a:shade val="50000"/>
+            </a:schemeClr>
+          </a:lnRef>
+          <a:fillRef idx="1">
+            <a:schemeClr val="accent1"/>
+          </a:fillRef>
+          <a:effectRef idx="0">
+            <a:schemeClr val="accent1"/>
+          </a:effectRef>
+          <a:fontRef idx="minor">
+            <a:schemeClr val="lt1"/>
+          </a:fontRef>
+        </p:style>
+        <p:txBody>
+          <a:bodyPr rtlCol="0" anchor="ctr"/>
+          <a:lstStyle/>
+          <a:p>
+            <a:r>
+              <a:rPr lang="en-US" sz="3200" dirty="0">
+                <a:solidFill>
+                  <a:schemeClr val="tx1"/>
+                </a:solidFill>
+              </a:rPr>
+              <a:t>GitHub</a:t>
+            </a:r>
+          </a:p>
+        </p:txBody>
+      </p:sp>
+      <p:sp>
+        <p:nvSpPr>
+          <p:cNvPr id="22" name="Rectangle: Rounded Corners 21">
+            <a:extLst>
+              <a:ext uri="{FF2B5EF4-FFF2-40B4-BE49-F238E27FC236}">
+                <a16:creationId xmlns:a16="http://schemas.microsoft.com/office/drawing/2014/main" id="{7ACF9D3B-13EA-45FB-BA10-2BB7ED86EA3D}"/>
+              </a:ext>
+            </a:extLst>
+          </p:cNvPr>
+          <p:cNvSpPr/>
+          <p:nvPr/>
+        </p:nvSpPr>
+        <p:spPr>
+          <a:xfrm>
+            <a:off x="451336" y="2321322"/>
+            <a:ext cx="2291849" cy="1991691"/>
+          </a:xfrm>
+          <a:prstGeom prst="roundRect">
+            <a:avLst/>
+          </a:prstGeom>
+          <a:noFill/>
+          <a:ln>
+            <a:solidFill>
+              <a:srgbClr val="3F51B5"/>
+            </a:solidFill>
+          </a:ln>
+        </p:spPr>
+        <p:style>
+          <a:lnRef idx="2">
+            <a:schemeClr val="accent1">
+              <a:shade val="50000"/>
+            </a:schemeClr>
+          </a:lnRef>
+          <a:fillRef idx="1">
+            <a:schemeClr val="accent1"/>
+          </a:fillRef>
+          <a:effectRef idx="0">
+            <a:schemeClr val="accent1"/>
+          </a:effectRef>
+          <a:fontRef idx="minor">
+            <a:schemeClr val="lt1"/>
+          </a:fontRef>
+        </p:style>
+        <p:txBody>
+          <a:bodyPr rtlCol="0" anchor="ctr"/>
+          <a:lstStyle/>
+          <a:p>
+            <a:r>
+              <a:rPr lang="en-US" sz="3200" dirty="0">
+                <a:solidFill>
+                  <a:schemeClr val="tx1"/>
+                </a:solidFill>
+              </a:rPr>
+              <a:t>Git</a:t>
+            </a:r>
+          </a:p>
+        </p:txBody>
+      </p:sp>
+      <p:cxnSp>
+        <p:nvCxnSpPr>
+          <p:cNvPr id="6" name="Straight Connector 5">
+            <a:extLst>
+              <a:ext uri="{FF2B5EF4-FFF2-40B4-BE49-F238E27FC236}">
+                <a16:creationId xmlns:a16="http://schemas.microsoft.com/office/drawing/2014/main" id="{F5DCE89E-9E87-487B-81F6-AA32D088C773}"/>
+              </a:ext>
+            </a:extLst>
+          </p:cNvPr>
+          <p:cNvCxnSpPr>
+            <a:cxnSpLocks/>
+          </p:cNvCxnSpPr>
+          <p:nvPr/>
+        </p:nvCxnSpPr>
+        <p:spPr>
+          <a:xfrm>
+            <a:off x="9677400" y="158968"/>
+            <a:ext cx="0" cy="6546632"/>
+          </a:xfrm>
+          <a:prstGeom prst="line">
+            <a:avLst/>
+          </a:prstGeom>
+          <a:ln w="28575">
+            <a:solidFill>
+              <a:schemeClr val="tx1">
+                <a:lumMod val="85000"/>
+                <a:lumOff val="15000"/>
+              </a:schemeClr>
+            </a:solidFill>
+          </a:ln>
+        </p:spPr>
+        <p:style>
+          <a:lnRef idx="1">
+            <a:schemeClr val="accent1"/>
+          </a:lnRef>
+          <a:fillRef idx="0">
+            <a:schemeClr val="accent1"/>
+          </a:fillRef>
+          <a:effectRef idx="0">
+            <a:schemeClr val="accent1"/>
+          </a:effectRef>
+          <a:fontRef idx="minor">
+            <a:schemeClr val="tx1"/>
+          </a:fontRef>
+        </p:style>
+      </p:cxnSp>
+      <p:pic>
+        <p:nvPicPr>
+          <p:cNvPr id="1026" name="Picture 2" descr="Image result for gmail.com logo">
+            <a:extLst>
+              <a:ext uri="{FF2B5EF4-FFF2-40B4-BE49-F238E27FC236}">
+                <a16:creationId xmlns:a16="http://schemas.microsoft.com/office/drawing/2014/main" id="{348B9E5E-AB32-4400-B0B4-E26A1CD78513}"/>
+              </a:ext>
+            </a:extLst>
+          </p:cNvPr>
+          <p:cNvPicPr>
+            <a:picLocks noChangeAspect="1" noChangeArrowheads="1"/>
+          </p:cNvPicPr>
+          <p:nvPr/>
+        </p:nvPicPr>
+        <p:blipFill rotWithShape="1">
+          <a:blip r:embed="rId2">
+            <a:extLst>
+              <a:ext uri="{28A0092B-C50C-407E-A947-70E740481C1C}">
+                <a14:useLocalDpi xmlns:a14="http://schemas.microsoft.com/office/drawing/2010/main" val="0"/>
+              </a:ext>
+            </a:extLst>
+          </a:blip>
+          <a:srcRect r="-3654" b="24854"/>
+          <a:stretch/>
+        </p:blipFill>
+        <p:spPr bwMode="auto">
+          <a:xfrm>
+            <a:off x="7619999" y="535080"/>
+            <a:ext cx="1974611" cy="1431535"/>
+          </a:xfrm>
+          <a:prstGeom prst="rect">
+            <a:avLst/>
+          </a:prstGeom>
+          <a:noFill/>
+          <a:extLst>
+            <a:ext uri="{909E8E84-426E-40DD-AFC4-6F175D3DCCD1}">
+              <a14:hiddenFill xmlns:a14="http://schemas.microsoft.com/office/drawing/2010/main">
+                <a:solidFill>
+                  <a:srgbClr val="FFFFFF"/>
+                </a:solidFill>
+              </a14:hiddenFill>
+            </a:ext>
+          </a:extLst>
+        </p:spPr>
+      </p:pic>
+      <p:pic>
+        <p:nvPicPr>
+          <p:cNvPr id="1030" name="Picture 6" descr="Image result for github logo">
+            <a:extLst>
+              <a:ext uri="{FF2B5EF4-FFF2-40B4-BE49-F238E27FC236}">
+                <a16:creationId xmlns:a16="http://schemas.microsoft.com/office/drawing/2014/main" id="{1056B59E-A288-443B-ADEF-5B5B8CE0D2D3}"/>
+              </a:ext>
+            </a:extLst>
+          </p:cNvPr>
+          <p:cNvPicPr>
+            <a:picLocks noChangeAspect="1" noChangeArrowheads="1"/>
+          </p:cNvPicPr>
+          <p:nvPr/>
+        </p:nvPicPr>
+        <p:blipFill rotWithShape="1">
+          <a:blip r:embed="rId3">
+            <a:extLst>
+              <a:ext uri="{28A0092B-C50C-407E-A947-70E740481C1C}">
+                <a14:useLocalDpi xmlns:a14="http://schemas.microsoft.com/office/drawing/2010/main" val="0"/>
+              </a:ext>
+            </a:extLst>
+          </a:blip>
+          <a:srcRect l="25308" t="13279" r="24626" b="11879"/>
+          <a:stretch/>
+        </p:blipFill>
+        <p:spPr bwMode="auto">
+          <a:xfrm>
+            <a:off x="10076866" y="799335"/>
+            <a:ext cx="1483102" cy="1154859"/>
+          </a:xfrm>
+          <a:prstGeom prst="rect">
+            <a:avLst/>
+          </a:prstGeom>
+          <a:noFill/>
+          <a:extLst>
+            <a:ext uri="{909E8E84-426E-40DD-AFC4-6F175D3DCCD1}">
+              <a14:hiddenFill xmlns:a14="http://schemas.microsoft.com/office/drawing/2010/main">
+                <a:solidFill>
+                  <a:srgbClr val="FFFFFF"/>
+                </a:solidFill>
+              </a14:hiddenFill>
+            </a:ext>
+          </a:extLst>
+        </p:spPr>
+      </p:pic>
+      <p:cxnSp>
+        <p:nvCxnSpPr>
+          <p:cNvPr id="19" name="Straight Arrow Connector 18">
+            <a:extLst>
+              <a:ext uri="{FF2B5EF4-FFF2-40B4-BE49-F238E27FC236}">
+                <a16:creationId xmlns:a16="http://schemas.microsoft.com/office/drawing/2014/main" id="{0DD20820-B1C1-4F4C-BE98-74B6AB02DA60}"/>
+              </a:ext>
+            </a:extLst>
+          </p:cNvPr>
+          <p:cNvCxnSpPr>
+            <a:cxnSpLocks/>
+          </p:cNvCxnSpPr>
+          <p:nvPr/>
+        </p:nvCxnSpPr>
+        <p:spPr>
+          <a:xfrm>
+            <a:off x="7848600" y="1954194"/>
+            <a:ext cx="0" cy="2770206"/>
+          </a:xfrm>
+          <a:prstGeom prst="straightConnector1">
+            <a:avLst/>
+          </a:prstGeom>
+          <a:ln w="38100">
+            <a:solidFill>
+              <a:srgbClr val="002060"/>
+            </a:solidFill>
+            <a:headEnd type="triangle"/>
+            <a:tailEnd type="triangle"/>
+          </a:ln>
+        </p:spPr>
+        <p:style>
+          <a:lnRef idx="1">
+            <a:schemeClr val="accent1"/>
+          </a:lnRef>
+          <a:fillRef idx="0">
+            <a:schemeClr val="accent1"/>
+          </a:fillRef>
+          <a:effectRef idx="0">
+            <a:schemeClr val="accent1"/>
+          </a:effectRef>
+          <a:fontRef idx="minor">
+            <a:schemeClr val="tx1"/>
+          </a:fontRef>
+        </p:style>
+      </p:cxnSp>
+      <p:cxnSp>
+        <p:nvCxnSpPr>
+          <p:cNvPr id="20" name="Straight Arrow Connector 19">
+            <a:extLst>
+              <a:ext uri="{FF2B5EF4-FFF2-40B4-BE49-F238E27FC236}">
+                <a16:creationId xmlns:a16="http://schemas.microsoft.com/office/drawing/2014/main" id="{27CB6290-5A4F-45F0-A6EE-ADA36E5A2D0A}"/>
+              </a:ext>
+            </a:extLst>
+          </p:cNvPr>
+          <p:cNvCxnSpPr>
+            <a:cxnSpLocks/>
+          </p:cNvCxnSpPr>
+          <p:nvPr/>
+        </p:nvCxnSpPr>
+        <p:spPr>
+          <a:xfrm flipH="1">
+            <a:off x="10330567" y="1966615"/>
+            <a:ext cx="4621" cy="2754767"/>
+          </a:xfrm>
+          <a:prstGeom prst="straightConnector1">
+            <a:avLst/>
+          </a:prstGeom>
+          <a:ln w="38100">
+            <a:solidFill>
+              <a:srgbClr val="002060"/>
+            </a:solidFill>
+            <a:headEnd type="triangle"/>
+            <a:tailEnd type="triangle"/>
+          </a:ln>
+        </p:spPr>
+        <p:style>
+          <a:lnRef idx="1">
+            <a:schemeClr val="accent1"/>
+          </a:lnRef>
+          <a:fillRef idx="0">
+            <a:schemeClr val="accent1"/>
+          </a:fillRef>
+          <a:effectRef idx="0">
+            <a:schemeClr val="accent1"/>
+          </a:effectRef>
+          <a:fontRef idx="minor">
+            <a:schemeClr val="tx1"/>
+          </a:fontRef>
+        </p:style>
+      </p:cxnSp>
+      <p:sp>
+        <p:nvSpPr>
+          <p:cNvPr id="1024" name="TextBox 1023">
+            <a:extLst>
+              <a:ext uri="{FF2B5EF4-FFF2-40B4-BE49-F238E27FC236}">
+                <a16:creationId xmlns:a16="http://schemas.microsoft.com/office/drawing/2014/main" id="{31B024FE-EE37-49BB-A374-1738F28F2179}"/>
+              </a:ext>
+            </a:extLst>
+          </p:cNvPr>
+          <p:cNvSpPr txBox="1"/>
+          <p:nvPr/>
+        </p:nvSpPr>
+        <p:spPr>
+          <a:xfrm>
+            <a:off x="7428561" y="398142"/>
+            <a:ext cx="2248830" cy="369332"/>
+          </a:xfrm>
+          <a:prstGeom prst="rect">
+            <a:avLst/>
+          </a:prstGeom>
+          <a:noFill/>
+        </p:spPr>
+        <p:txBody>
+          <a:bodyPr wrap="square" rtlCol="0">
+            <a:spAutoFit/>
+          </a:bodyPr>
+          <a:lstStyle/>
+          <a:p>
+            <a:pPr algn="ctr"/>
+            <a:r>
+              <a:rPr lang="en-US" b="1" dirty="0"/>
+              <a:t>gmail.com</a:t>
+            </a:r>
+          </a:p>
+        </p:txBody>
+      </p:sp>
+      <p:sp>
+        <p:nvSpPr>
+          <p:cNvPr id="38" name="TextBox 37">
+            <a:extLst>
+              <a:ext uri="{FF2B5EF4-FFF2-40B4-BE49-F238E27FC236}">
+                <a16:creationId xmlns:a16="http://schemas.microsoft.com/office/drawing/2014/main" id="{825263F5-05B5-4E96-BBD4-B801A73A93CD}"/>
+              </a:ext>
+            </a:extLst>
+          </p:cNvPr>
+          <p:cNvSpPr txBox="1"/>
+          <p:nvPr/>
+        </p:nvSpPr>
+        <p:spPr>
+          <a:xfrm>
+            <a:off x="9677391" y="395303"/>
+            <a:ext cx="2364807" cy="369332"/>
+          </a:xfrm>
+          <a:prstGeom prst="rect">
+            <a:avLst/>
+          </a:prstGeom>
+          <a:noFill/>
+        </p:spPr>
+        <p:txBody>
+          <a:bodyPr wrap="square" rtlCol="0">
+            <a:spAutoFit/>
+          </a:bodyPr>
+          <a:lstStyle/>
+          <a:p>
+            <a:pPr algn="ctr"/>
+            <a:r>
+              <a:rPr lang="en-US" b="1" dirty="0"/>
+              <a:t>github.com</a:t>
+            </a:r>
+          </a:p>
+        </p:txBody>
+      </p:sp>
+      <p:sp>
+        <p:nvSpPr>
+          <p:cNvPr id="1025" name="Rectangle: Rounded Corners 1024">
+            <a:extLst>
+              <a:ext uri="{FF2B5EF4-FFF2-40B4-BE49-F238E27FC236}">
+                <a16:creationId xmlns:a16="http://schemas.microsoft.com/office/drawing/2014/main" id="{CBC49110-8BEF-47C6-B0B8-63E05F7D97F1}"/>
+              </a:ext>
+            </a:extLst>
+          </p:cNvPr>
+          <p:cNvSpPr/>
+          <p:nvPr/>
+        </p:nvSpPr>
+        <p:spPr>
+          <a:xfrm>
+            <a:off x="1904997" y="312754"/>
+            <a:ext cx="5523563" cy="1817828"/>
+          </a:xfrm>
+          <a:prstGeom prst="roundRect">
+            <a:avLst/>
+          </a:prstGeom>
+          <a:solidFill>
+            <a:schemeClr val="bg1"/>
+          </a:solidFill>
+          <a:ln>
+            <a:solidFill>
+              <a:srgbClr val="3F51B5"/>
+            </a:solidFill>
+          </a:ln>
+        </p:spPr>
+        <p:style>
+          <a:lnRef idx="2">
+            <a:schemeClr val="accent1">
+              <a:shade val="50000"/>
+            </a:schemeClr>
+          </a:lnRef>
+          <a:fillRef idx="1">
+            <a:schemeClr val="accent1"/>
+          </a:fillRef>
+          <a:effectRef idx="0">
+            <a:schemeClr val="accent1"/>
+          </a:effectRef>
+          <a:fontRef idx="minor">
+            <a:schemeClr val="lt1"/>
+          </a:fontRef>
+        </p:style>
+        <p:txBody>
+          <a:bodyPr rtlCol="0" anchor="ctr"/>
+          <a:lstStyle/>
+          <a:p>
+            <a:pPr marL="182563" indent="-182563">
+              <a:buFont typeface="Arial" panose="020B0604020202020204" pitchFamily="34" charset="0"/>
+              <a:buChar char="•"/>
+            </a:pPr>
+            <a:r>
+              <a:rPr lang="en-US" sz="2100" b="1" dirty="0">
+                <a:solidFill>
+                  <a:schemeClr val="tx1"/>
+                </a:solidFill>
+              </a:rPr>
+              <a:t>Gmail.com </a:t>
+            </a:r>
+            <a:r>
+              <a:rPr lang="en-US" sz="2100" dirty="0">
+                <a:solidFill>
+                  <a:schemeClr val="tx1"/>
+                </a:solidFill>
+              </a:rPr>
+              <a:t>is the biggest web host of e-mail.</a:t>
+            </a:r>
+          </a:p>
+          <a:p>
+            <a:pPr marL="182563" indent="-182563">
+              <a:buFont typeface="Arial" panose="020B0604020202020204" pitchFamily="34" charset="0"/>
+              <a:buChar char="•"/>
+            </a:pPr>
+            <a:r>
+              <a:rPr lang="en-US" sz="2100" b="1" dirty="0">
+                <a:solidFill>
+                  <a:schemeClr val="tx1"/>
+                </a:solidFill>
+              </a:rPr>
+              <a:t>GitHub.com </a:t>
+            </a:r>
+            <a:r>
+              <a:rPr lang="en-US" sz="2100" dirty="0">
+                <a:solidFill>
+                  <a:schemeClr val="tx1"/>
+                </a:solidFill>
+              </a:rPr>
+              <a:t>is the biggest web host of Git projects. </a:t>
+            </a:r>
+          </a:p>
+        </p:txBody>
+      </p:sp>
+      <p:sp>
+        <p:nvSpPr>
+          <p:cNvPr id="42" name="Rectangle: Rounded Corners 41">
+            <a:extLst>
+              <a:ext uri="{FF2B5EF4-FFF2-40B4-BE49-F238E27FC236}">
+                <a16:creationId xmlns:a16="http://schemas.microsoft.com/office/drawing/2014/main" id="{52719AC5-7973-4092-B284-74CA607E417F}"/>
+              </a:ext>
+            </a:extLst>
+          </p:cNvPr>
+          <p:cNvSpPr/>
+          <p:nvPr/>
+        </p:nvSpPr>
+        <p:spPr>
+          <a:xfrm>
+            <a:off x="1904979" y="2321321"/>
+            <a:ext cx="5523582" cy="1991693"/>
+          </a:xfrm>
+          <a:prstGeom prst="roundRect">
+            <a:avLst/>
+          </a:prstGeom>
+          <a:solidFill>
+            <a:schemeClr val="bg1"/>
+          </a:solidFill>
+          <a:ln>
+            <a:solidFill>
+              <a:srgbClr val="3F51B5"/>
+            </a:solidFill>
+          </a:ln>
+        </p:spPr>
+        <p:style>
+          <a:lnRef idx="2">
+            <a:schemeClr val="accent1">
+              <a:shade val="50000"/>
+            </a:schemeClr>
+          </a:lnRef>
+          <a:fillRef idx="1">
+            <a:schemeClr val="accent1"/>
+          </a:fillRef>
+          <a:effectRef idx="0">
+            <a:schemeClr val="accent1"/>
+          </a:effectRef>
+          <a:fontRef idx="minor">
+            <a:schemeClr val="lt1"/>
+          </a:fontRef>
+        </p:style>
+        <p:txBody>
+          <a:bodyPr rtlCol="0" anchor="ctr"/>
+          <a:lstStyle/>
+          <a:p>
+            <a:pPr marL="182563" indent="-182563">
+              <a:buFont typeface="Arial" panose="020B0604020202020204" pitchFamily="34" charset="0"/>
+              <a:buChar char="•"/>
+            </a:pPr>
+            <a:r>
+              <a:rPr lang="en-US" sz="2100" b="1" dirty="0">
+                <a:solidFill>
+                  <a:schemeClr val="tx1"/>
+                </a:solidFill>
+              </a:rPr>
+              <a:t>E-mail </a:t>
+            </a:r>
+            <a:r>
+              <a:rPr lang="en-US" sz="2100" dirty="0">
+                <a:solidFill>
+                  <a:schemeClr val="tx1"/>
+                </a:solidFill>
+              </a:rPr>
+              <a:t>is a protocol for sending letters online, it’s the same no matter which e-mail server you use</a:t>
+            </a:r>
+          </a:p>
+          <a:p>
+            <a:pPr marL="182563" indent="-182563">
+              <a:buFont typeface="Arial" panose="020B0604020202020204" pitchFamily="34" charset="0"/>
+              <a:buChar char="•"/>
+            </a:pPr>
+            <a:r>
+              <a:rPr lang="en-US" sz="2100" b="1" dirty="0">
+                <a:solidFill>
+                  <a:schemeClr val="tx1"/>
+                </a:solidFill>
+              </a:rPr>
+              <a:t>Git </a:t>
+            </a:r>
+            <a:r>
+              <a:rPr lang="en-US" sz="2100" dirty="0">
+                <a:solidFill>
+                  <a:schemeClr val="tx1"/>
+                </a:solidFill>
+              </a:rPr>
+              <a:t>is a protocol for sharing versions of your code, it’s the same thing on all Git servers</a:t>
+            </a:r>
+          </a:p>
+        </p:txBody>
+      </p:sp>
+      <p:sp>
+        <p:nvSpPr>
+          <p:cNvPr id="1029" name="TextBox 1028">
+            <a:extLst>
+              <a:ext uri="{FF2B5EF4-FFF2-40B4-BE49-F238E27FC236}">
+                <a16:creationId xmlns:a16="http://schemas.microsoft.com/office/drawing/2014/main" id="{0F909E12-CBA1-48D5-B315-CC797D0CC391}"/>
+              </a:ext>
+            </a:extLst>
+          </p:cNvPr>
+          <p:cNvSpPr txBox="1"/>
+          <p:nvPr/>
+        </p:nvSpPr>
+        <p:spPr>
+          <a:xfrm>
+            <a:off x="8114570" y="2994003"/>
+            <a:ext cx="1144434" cy="646331"/>
+          </a:xfrm>
+          <a:prstGeom prst="rect">
+            <a:avLst/>
+          </a:prstGeom>
+          <a:noFill/>
+        </p:spPr>
+        <p:txBody>
+          <a:bodyPr wrap="square" rtlCol="0">
+            <a:spAutoFit/>
+          </a:bodyPr>
+          <a:lstStyle/>
+          <a:p>
+            <a:pPr algn="ctr"/>
+            <a:r>
+              <a:rPr lang="en-US" dirty="0"/>
+              <a:t>E-mail Protocol</a:t>
+            </a:r>
+          </a:p>
+        </p:txBody>
+      </p:sp>
+      <p:sp>
+        <p:nvSpPr>
+          <p:cNvPr id="47" name="TextBox 46">
+            <a:extLst>
+              <a:ext uri="{FF2B5EF4-FFF2-40B4-BE49-F238E27FC236}">
+                <a16:creationId xmlns:a16="http://schemas.microsoft.com/office/drawing/2014/main" id="{44639CA1-7BCE-4558-A8D3-61BD69612C08}"/>
+              </a:ext>
+            </a:extLst>
+          </p:cNvPr>
+          <p:cNvSpPr txBox="1"/>
+          <p:nvPr/>
+        </p:nvSpPr>
+        <p:spPr>
+          <a:xfrm>
+            <a:off x="10599456" y="2994001"/>
+            <a:ext cx="1144434" cy="646331"/>
+          </a:xfrm>
+          <a:prstGeom prst="rect">
+            <a:avLst/>
+          </a:prstGeom>
+          <a:noFill/>
+        </p:spPr>
+        <p:txBody>
+          <a:bodyPr wrap="square" rtlCol="0">
+            <a:spAutoFit/>
+          </a:bodyPr>
+          <a:lstStyle/>
+          <a:p>
+            <a:pPr algn="ctr"/>
+            <a:r>
+              <a:rPr lang="en-US" dirty="0"/>
+              <a:t>Git</a:t>
+            </a:r>
+          </a:p>
+          <a:p>
+            <a:pPr algn="ctr"/>
+            <a:r>
+              <a:rPr lang="en-US" dirty="0"/>
+              <a:t>Protocol</a:t>
+            </a:r>
+          </a:p>
+        </p:txBody>
+      </p:sp>
+    </p:spTree>
+    <p:extLst>
+      <p:ext uri="{BB962C8B-B14F-4D97-AF65-F5344CB8AC3E}">
+        <p14:creationId xmlns:p14="http://schemas.microsoft.com/office/powerpoint/2010/main" val="3852138906"/>
+      </p:ext>
+    </p:extLst>
+  </p:cSld>
+  <p:clrMapOvr>
+    <a:masterClrMapping/>
+  </p:clrMapOvr>
+</p:sld>
+</file>
+
+<file path=ppt/slides/slide4.xml><?xml version="1.0" encoding="utf-8"?>
+<p:sld xmlns:a="http://schemas.openxmlformats.org/drawingml/2006/main" xmlns:r="http://schemas.openxmlformats.org/officeDocument/2006/relationships" xmlns:p="http://schemas.openxmlformats.org/presentationml/2006/main">
+  <p:cSld>
+    <p:bg>
+      <p:bgPr>
+        <a:solidFill>
+          <a:schemeClr val="bg1">
+            <a:alpha val="0"/>
+          </a:schemeClr>
+        </a:solidFill>
+        <a:effectLst/>
+      </p:bgPr>
+    </p:bg>
+    <p:spTree>
+      <p:nvGrpSpPr>
+        <p:cNvPr id="1" name=""/>
+        <p:cNvGrpSpPr/>
+        <p:nvPr/>
+      </p:nvGrpSpPr>
+      <p:grpSpPr>
+        <a:xfrm>
+          <a:off x="0" y="0"/>
+          <a:ext cx="0" cy="0"/>
+          <a:chOff x="0" y="0"/>
+          <a:chExt cx="0" cy="0"/>
+        </a:xfrm>
+      </p:grpSpPr>
+      <p:sp>
+        <p:nvSpPr>
+          <p:cNvPr id="16" name="Rectangle: Rounded Corners 15">
+            <a:extLst>
+              <a:ext uri="{FF2B5EF4-FFF2-40B4-BE49-F238E27FC236}">
+                <a16:creationId xmlns:a16="http://schemas.microsoft.com/office/drawing/2014/main" id="{14B497D0-2328-4FE4-B2A3-81D3845514C5}"/>
+              </a:ext>
+            </a:extLst>
+          </p:cNvPr>
+          <p:cNvSpPr/>
+          <p:nvPr/>
+        </p:nvSpPr>
+        <p:spPr>
+          <a:xfrm>
+            <a:off x="451317" y="312754"/>
+            <a:ext cx="11590882" cy="1817827"/>
+          </a:xfrm>
+          <a:prstGeom prst="roundRect">
+            <a:avLst/>
+          </a:prstGeom>
+          <a:solidFill>
+            <a:schemeClr val="bg1"/>
+          </a:solidFill>
+          <a:ln>
+            <a:solidFill>
+              <a:srgbClr val="3F51B5"/>
+            </a:solidFill>
+            <a:prstDash val="dash"/>
+          </a:ln>
+        </p:spPr>
+        <p:style>
+          <a:lnRef idx="2">
+            <a:schemeClr val="accent1">
+              <a:shade val="50000"/>
+            </a:schemeClr>
+          </a:lnRef>
+          <a:fillRef idx="1">
+            <a:schemeClr val="accent1"/>
+          </a:fillRef>
+          <a:effectRef idx="0">
+            <a:schemeClr val="accent1"/>
+          </a:effectRef>
+          <a:fontRef idx="minor">
+            <a:schemeClr val="lt1"/>
+          </a:fontRef>
+        </p:style>
+        <p:txBody>
+          <a:bodyPr rtlCol="0" anchor="ctr"/>
+          <a:lstStyle/>
+          <a:p>
+            <a:pPr algn="ctr"/>
+            <a:endParaRPr lang="en-US"/>
+          </a:p>
+        </p:txBody>
+      </p:sp>
+      <p:sp>
+        <p:nvSpPr>
+          <p:cNvPr id="27" name="Rectangle: Rounded Corners 26">
+            <a:extLst>
+              <a:ext uri="{FF2B5EF4-FFF2-40B4-BE49-F238E27FC236}">
+                <a16:creationId xmlns:a16="http://schemas.microsoft.com/office/drawing/2014/main" id="{3E3EC81A-B589-412F-8603-0877A3A627FE}"/>
+              </a:ext>
+            </a:extLst>
+          </p:cNvPr>
+          <p:cNvSpPr/>
+          <p:nvPr/>
+        </p:nvSpPr>
+        <p:spPr>
+          <a:xfrm>
+            <a:off x="451336" y="2321321"/>
+            <a:ext cx="11590882" cy="1991693"/>
+          </a:xfrm>
+          <a:prstGeom prst="roundRect">
+            <a:avLst/>
+          </a:prstGeom>
+          <a:solidFill>
+            <a:schemeClr val="bg1"/>
+          </a:solidFill>
+          <a:ln>
+            <a:solidFill>
+              <a:srgbClr val="3F51B5"/>
+            </a:solidFill>
+            <a:prstDash val="dash"/>
+          </a:ln>
+        </p:spPr>
+        <p:style>
+          <a:lnRef idx="2">
+            <a:schemeClr val="accent1">
+              <a:shade val="50000"/>
+            </a:schemeClr>
+          </a:lnRef>
+          <a:fillRef idx="1">
+            <a:schemeClr val="accent1"/>
+          </a:fillRef>
+          <a:effectRef idx="0">
+            <a:schemeClr val="accent1"/>
+          </a:effectRef>
+          <a:fontRef idx="minor">
+            <a:schemeClr val="lt1"/>
+          </a:fontRef>
+        </p:style>
+        <p:txBody>
+          <a:bodyPr rtlCol="0" anchor="ctr"/>
+          <a:lstStyle/>
+          <a:p>
+            <a:pPr algn="ctr"/>
+            <a:endParaRPr lang="en-US" dirty="0"/>
+          </a:p>
+        </p:txBody>
+      </p:sp>
+      <p:sp>
+        <p:nvSpPr>
+          <p:cNvPr id="43" name="Rectangle: Rounded Corners 42">
+            <a:extLst>
+              <a:ext uri="{FF2B5EF4-FFF2-40B4-BE49-F238E27FC236}">
+                <a16:creationId xmlns:a16="http://schemas.microsoft.com/office/drawing/2014/main" id="{A1C14A0E-8A47-4DF1-8097-95F7A82C8311}"/>
+              </a:ext>
+            </a:extLst>
+          </p:cNvPr>
+          <p:cNvSpPr/>
+          <p:nvPr/>
+        </p:nvSpPr>
+        <p:spPr>
+          <a:xfrm>
+            <a:off x="451337" y="4503755"/>
+            <a:ext cx="11590882" cy="2068434"/>
+          </a:xfrm>
+          <a:prstGeom prst="roundRect">
+            <a:avLst/>
+          </a:prstGeom>
+          <a:solidFill>
+            <a:schemeClr val="bg1"/>
+          </a:solidFill>
+          <a:ln>
+            <a:solidFill>
+              <a:srgbClr val="3F51B5"/>
+            </a:solidFill>
+            <a:prstDash val="dash"/>
+          </a:ln>
+        </p:spPr>
+        <p:style>
+          <a:lnRef idx="2">
+            <a:schemeClr val="accent1">
+              <a:shade val="50000"/>
+            </a:schemeClr>
+          </a:lnRef>
+          <a:fillRef idx="1">
+            <a:schemeClr val="accent1"/>
+          </a:fillRef>
+          <a:effectRef idx="0">
+            <a:schemeClr val="accent1"/>
+          </a:effectRef>
+          <a:fontRef idx="minor">
+            <a:schemeClr val="lt1"/>
+          </a:fontRef>
+        </p:style>
+        <p:txBody>
+          <a:bodyPr rtlCol="0" anchor="ctr"/>
+          <a:lstStyle/>
+          <a:p>
+            <a:pPr algn="ctr"/>
+            <a:endParaRPr lang="en-US" dirty="0"/>
+          </a:p>
+        </p:txBody>
+      </p:sp>
+      <p:sp>
+        <p:nvSpPr>
+          <p:cNvPr id="26" name="Rectangle: Rounded Corners 25">
+            <a:extLst>
+              <a:ext uri="{FF2B5EF4-FFF2-40B4-BE49-F238E27FC236}">
+                <a16:creationId xmlns:a16="http://schemas.microsoft.com/office/drawing/2014/main" id="{525FA5A2-7D1C-4E62-84AE-F95348672B2F}"/>
+              </a:ext>
+            </a:extLst>
+          </p:cNvPr>
+          <p:cNvSpPr/>
+          <p:nvPr/>
+        </p:nvSpPr>
+        <p:spPr>
+          <a:xfrm>
+            <a:off x="451336" y="4503754"/>
+            <a:ext cx="2291849" cy="2068434"/>
+          </a:xfrm>
+          <a:prstGeom prst="roundRect">
+            <a:avLst/>
+          </a:prstGeom>
+          <a:noFill/>
+          <a:ln>
+            <a:solidFill>
+              <a:srgbClr val="3F51B5"/>
+            </a:solidFill>
+          </a:ln>
+        </p:spPr>
+        <p:style>
+          <a:lnRef idx="2">
+            <a:schemeClr val="accent1">
+              <a:shade val="50000"/>
+            </a:schemeClr>
+          </a:lnRef>
+          <a:fillRef idx="1">
+            <a:schemeClr val="accent1"/>
+          </a:fillRef>
+          <a:effectRef idx="0">
+            <a:schemeClr val="accent1"/>
+          </a:effectRef>
+          <a:fontRef idx="minor">
+            <a:schemeClr val="lt1"/>
+          </a:fontRef>
+        </p:style>
+        <p:txBody>
+          <a:bodyPr rtlCol="0" anchor="ctr"/>
+          <a:lstStyle/>
+          <a:p>
+            <a:r>
+              <a:rPr lang="en-US" sz="3200" dirty="0">
+                <a:solidFill>
+                  <a:schemeClr val="tx1"/>
+                </a:solidFill>
+              </a:rPr>
+              <a:t>Git</a:t>
+            </a:r>
+          </a:p>
+          <a:p>
+            <a:r>
+              <a:rPr lang="en-US" sz="3200" dirty="0">
+                <a:solidFill>
+                  <a:schemeClr val="tx1"/>
+                </a:solidFill>
+              </a:rPr>
+              <a:t>Client</a:t>
+            </a:r>
+          </a:p>
+        </p:txBody>
+      </p:sp>
+      <p:sp>
+        <p:nvSpPr>
+          <p:cNvPr id="23" name="Rectangle: Rounded Corners 22">
+            <a:extLst>
+              <a:ext uri="{FF2B5EF4-FFF2-40B4-BE49-F238E27FC236}">
+                <a16:creationId xmlns:a16="http://schemas.microsoft.com/office/drawing/2014/main" id="{2C1879ED-87D0-425F-84A1-D4F0BDB35DE2}"/>
+              </a:ext>
+            </a:extLst>
+          </p:cNvPr>
+          <p:cNvSpPr/>
+          <p:nvPr/>
+        </p:nvSpPr>
+        <p:spPr>
+          <a:xfrm>
+            <a:off x="451336" y="312754"/>
+            <a:ext cx="2291863" cy="1817828"/>
+          </a:xfrm>
+          <a:prstGeom prst="roundRect">
+            <a:avLst/>
+          </a:prstGeom>
+          <a:noFill/>
+          <a:ln>
+            <a:solidFill>
+              <a:srgbClr val="3F51B5"/>
+            </a:solidFill>
+          </a:ln>
+        </p:spPr>
+        <p:style>
+          <a:lnRef idx="2">
+            <a:schemeClr val="accent1">
+              <a:shade val="50000"/>
+            </a:schemeClr>
+          </a:lnRef>
+          <a:fillRef idx="1">
+            <a:schemeClr val="accent1"/>
+          </a:fillRef>
+          <a:effectRef idx="0">
+            <a:schemeClr val="accent1"/>
+          </a:effectRef>
+          <a:fontRef idx="minor">
+            <a:schemeClr val="lt1"/>
+          </a:fontRef>
+        </p:style>
+        <p:txBody>
+          <a:bodyPr rtlCol="0" anchor="ctr"/>
+          <a:lstStyle/>
+          <a:p>
+            <a:r>
+              <a:rPr lang="en-US" sz="3200" dirty="0">
+                <a:solidFill>
+                  <a:schemeClr val="tx1"/>
+                </a:solidFill>
+              </a:rPr>
+              <a:t>GitHub</a:t>
+            </a:r>
+          </a:p>
+        </p:txBody>
+      </p:sp>
+      <p:sp>
+        <p:nvSpPr>
+          <p:cNvPr id="22" name="Rectangle: Rounded Corners 21">
+            <a:extLst>
+              <a:ext uri="{FF2B5EF4-FFF2-40B4-BE49-F238E27FC236}">
+                <a16:creationId xmlns:a16="http://schemas.microsoft.com/office/drawing/2014/main" id="{7ACF9D3B-13EA-45FB-BA10-2BB7ED86EA3D}"/>
+              </a:ext>
+            </a:extLst>
+          </p:cNvPr>
+          <p:cNvSpPr/>
+          <p:nvPr/>
+        </p:nvSpPr>
+        <p:spPr>
+          <a:xfrm>
+            <a:off x="451336" y="2321322"/>
+            <a:ext cx="2291849" cy="1991691"/>
+          </a:xfrm>
+          <a:prstGeom prst="roundRect">
+            <a:avLst/>
+          </a:prstGeom>
+          <a:noFill/>
+          <a:ln>
+            <a:solidFill>
+              <a:srgbClr val="3F51B5"/>
+            </a:solidFill>
+          </a:ln>
+        </p:spPr>
+        <p:style>
+          <a:lnRef idx="2">
+            <a:schemeClr val="accent1">
+              <a:shade val="50000"/>
+            </a:schemeClr>
+          </a:lnRef>
+          <a:fillRef idx="1">
+            <a:schemeClr val="accent1"/>
+          </a:fillRef>
+          <a:effectRef idx="0">
+            <a:schemeClr val="accent1"/>
+          </a:effectRef>
+          <a:fontRef idx="minor">
+            <a:schemeClr val="lt1"/>
+          </a:fontRef>
+        </p:style>
+        <p:txBody>
+          <a:bodyPr rtlCol="0" anchor="ctr"/>
+          <a:lstStyle/>
+          <a:p>
+            <a:r>
+              <a:rPr lang="en-US" sz="3200" dirty="0">
+                <a:solidFill>
+                  <a:schemeClr val="tx1"/>
+                </a:solidFill>
+              </a:rPr>
+              <a:t>Git</a:t>
+            </a:r>
+          </a:p>
+        </p:txBody>
+      </p:sp>
+      <p:cxnSp>
+        <p:nvCxnSpPr>
+          <p:cNvPr id="6" name="Straight Connector 5">
+            <a:extLst>
+              <a:ext uri="{FF2B5EF4-FFF2-40B4-BE49-F238E27FC236}">
+                <a16:creationId xmlns:a16="http://schemas.microsoft.com/office/drawing/2014/main" id="{F5DCE89E-9E87-487B-81F6-AA32D088C773}"/>
+              </a:ext>
+            </a:extLst>
+          </p:cNvPr>
+          <p:cNvCxnSpPr>
+            <a:cxnSpLocks/>
+          </p:cNvCxnSpPr>
+          <p:nvPr/>
+        </p:nvCxnSpPr>
+        <p:spPr>
+          <a:xfrm>
+            <a:off x="9677400" y="158968"/>
+            <a:ext cx="0" cy="6546632"/>
+          </a:xfrm>
+          <a:prstGeom prst="line">
+            <a:avLst/>
+          </a:prstGeom>
+          <a:ln w="28575">
+            <a:solidFill>
+              <a:schemeClr val="tx1">
+                <a:lumMod val="85000"/>
+                <a:lumOff val="15000"/>
+              </a:schemeClr>
+            </a:solidFill>
+          </a:ln>
+        </p:spPr>
+        <p:style>
+          <a:lnRef idx="1">
+            <a:schemeClr val="accent1"/>
+          </a:lnRef>
+          <a:fillRef idx="0">
+            <a:schemeClr val="accent1"/>
+          </a:fillRef>
+          <a:effectRef idx="0">
+            <a:schemeClr val="accent1"/>
+          </a:effectRef>
+          <a:fontRef idx="minor">
+            <a:schemeClr val="tx1"/>
+          </a:fontRef>
+        </p:style>
+      </p:cxnSp>
+      <p:pic>
+        <p:nvPicPr>
+          <p:cNvPr id="13" name="Picture 12">
+            <a:extLst>
+              <a:ext uri="{FF2B5EF4-FFF2-40B4-BE49-F238E27FC236}">
+                <a16:creationId xmlns:a16="http://schemas.microsoft.com/office/drawing/2014/main" id="{47081FD5-09A1-454D-81ED-3CB4D5290E5A}"/>
+              </a:ext>
+            </a:extLst>
+          </p:cNvPr>
+          <p:cNvPicPr>
+            <a:picLocks noChangeAspect="1"/>
+          </p:cNvPicPr>
+          <p:nvPr/>
+        </p:nvPicPr>
+        <p:blipFill>
+          <a:blip r:embed="rId2">
+            <a:extLst>
+              <a:ext uri="{28A0092B-C50C-407E-A947-70E740481C1C}">
+                <a14:useLocalDpi xmlns:a14="http://schemas.microsoft.com/office/drawing/2010/main" val="0"/>
+              </a:ext>
+            </a:extLst>
+          </a:blip>
+          <a:stretch>
+            <a:fillRect/>
+          </a:stretch>
+        </p:blipFill>
+        <p:spPr>
+          <a:xfrm>
+            <a:off x="7697070" y="5334000"/>
+            <a:ext cx="1800193" cy="1197947"/>
+          </a:xfrm>
+          <a:prstGeom prst="rect">
+            <a:avLst/>
+          </a:prstGeom>
+        </p:spPr>
+      </p:pic>
+      <p:pic>
+        <p:nvPicPr>
+          <p:cNvPr id="1028" name="Picture 4" descr="Image result for outlook logo">
+            <a:extLst>
+              <a:ext uri="{FF2B5EF4-FFF2-40B4-BE49-F238E27FC236}">
+                <a16:creationId xmlns:a16="http://schemas.microsoft.com/office/drawing/2014/main" id="{D558FD85-459D-4F8D-8B2F-F7E76F532221}"/>
+              </a:ext>
+            </a:extLst>
+          </p:cNvPr>
+          <p:cNvPicPr>
+            <a:picLocks noChangeAspect="1" noChangeArrowheads="1"/>
+          </p:cNvPicPr>
+          <p:nvPr/>
+        </p:nvPicPr>
+        <p:blipFill>
+          <a:blip r:embed="rId3">
+            <a:extLst>
+              <a:ext uri="{28A0092B-C50C-407E-A947-70E740481C1C}">
+                <a14:useLocalDpi xmlns:a14="http://schemas.microsoft.com/office/drawing/2010/main" val="0"/>
+              </a:ext>
+            </a:extLst>
+          </a:blip>
+          <a:srcRect/>
+          <a:stretch>
+            <a:fillRect/>
+          </a:stretch>
+        </p:blipFill>
+        <p:spPr bwMode="auto">
+          <a:xfrm>
+            <a:off x="7678262" y="4649294"/>
+            <a:ext cx="1837810" cy="1042248"/>
+          </a:xfrm>
+          <a:prstGeom prst="rect">
+            <a:avLst/>
+          </a:prstGeom>
+          <a:noFill/>
+          <a:extLst>
+            <a:ext uri="{909E8E84-426E-40DD-AFC4-6F175D3DCCD1}">
+              <a14:hiddenFill xmlns:a14="http://schemas.microsoft.com/office/drawing/2010/main">
+                <a:solidFill>
+                  <a:srgbClr val="FFFFFF"/>
+                </a:solidFill>
+              </a14:hiddenFill>
+            </a:ext>
+          </a:extLst>
+        </p:spPr>
+      </p:pic>
+      <p:pic>
+        <p:nvPicPr>
+          <p:cNvPr id="1030" name="Picture 6" descr="Image result for github logo">
+            <a:extLst>
+              <a:ext uri="{FF2B5EF4-FFF2-40B4-BE49-F238E27FC236}">
+                <a16:creationId xmlns:a16="http://schemas.microsoft.com/office/drawing/2014/main" id="{1056B59E-A288-443B-ADEF-5B5B8CE0D2D3}"/>
+              </a:ext>
+            </a:extLst>
+          </p:cNvPr>
+          <p:cNvPicPr>
+            <a:picLocks noChangeAspect="1" noChangeArrowheads="1"/>
+          </p:cNvPicPr>
+          <p:nvPr/>
+        </p:nvPicPr>
+        <p:blipFill rotWithShape="1">
+          <a:blip r:embed="rId4">
+            <a:extLst>
+              <a:ext uri="{28A0092B-C50C-407E-A947-70E740481C1C}">
+                <a14:useLocalDpi xmlns:a14="http://schemas.microsoft.com/office/drawing/2010/main" val="0"/>
+              </a:ext>
+            </a:extLst>
+          </a:blip>
+          <a:srcRect l="25308" t="13279" r="24626" b="11879"/>
+          <a:stretch/>
+        </p:blipFill>
+        <p:spPr bwMode="auto">
+          <a:xfrm>
+            <a:off x="10076866" y="799335"/>
+            <a:ext cx="1483102" cy="1154859"/>
+          </a:xfrm>
+          <a:prstGeom prst="rect">
+            <a:avLst/>
+          </a:prstGeom>
+          <a:noFill/>
+          <a:extLst>
+            <a:ext uri="{909E8E84-426E-40DD-AFC4-6F175D3DCCD1}">
+              <a14:hiddenFill xmlns:a14="http://schemas.microsoft.com/office/drawing/2010/main">
+                <a:solidFill>
+                  <a:srgbClr val="FFFFFF"/>
+                </a:solidFill>
+              </a14:hiddenFill>
+            </a:ext>
+          </a:extLst>
+        </p:spPr>
+      </p:pic>
+      <p:cxnSp>
+        <p:nvCxnSpPr>
+          <p:cNvPr id="19" name="Straight Arrow Connector 18">
+            <a:extLst>
+              <a:ext uri="{FF2B5EF4-FFF2-40B4-BE49-F238E27FC236}">
+                <a16:creationId xmlns:a16="http://schemas.microsoft.com/office/drawing/2014/main" id="{0DD20820-B1C1-4F4C-BE98-74B6AB02DA60}"/>
+              </a:ext>
+            </a:extLst>
+          </p:cNvPr>
+          <p:cNvCxnSpPr>
+            <a:cxnSpLocks/>
+          </p:cNvCxnSpPr>
+          <p:nvPr/>
+        </p:nvCxnSpPr>
+        <p:spPr>
+          <a:xfrm>
+            <a:off x="7848600" y="1954194"/>
+            <a:ext cx="0" cy="2770206"/>
+          </a:xfrm>
+          <a:prstGeom prst="straightConnector1">
+            <a:avLst/>
+          </a:prstGeom>
+          <a:ln w="38100">
+            <a:solidFill>
+              <a:srgbClr val="002060"/>
+            </a:solidFill>
+            <a:headEnd type="triangle"/>
+            <a:tailEnd type="triangle"/>
+          </a:ln>
+        </p:spPr>
+        <p:style>
+          <a:lnRef idx="1">
+            <a:schemeClr val="accent1"/>
+          </a:lnRef>
+          <a:fillRef idx="0">
+            <a:schemeClr val="accent1"/>
+          </a:fillRef>
+          <a:effectRef idx="0">
+            <a:schemeClr val="accent1"/>
+          </a:effectRef>
+          <a:fontRef idx="minor">
+            <a:schemeClr val="tx1"/>
+          </a:fontRef>
+        </p:style>
+      </p:cxnSp>
+      <p:cxnSp>
+        <p:nvCxnSpPr>
+          <p:cNvPr id="20" name="Straight Arrow Connector 19">
+            <a:extLst>
+              <a:ext uri="{FF2B5EF4-FFF2-40B4-BE49-F238E27FC236}">
+                <a16:creationId xmlns:a16="http://schemas.microsoft.com/office/drawing/2014/main" id="{27CB6290-5A4F-45F0-A6EE-ADA36E5A2D0A}"/>
+              </a:ext>
+            </a:extLst>
+          </p:cNvPr>
+          <p:cNvCxnSpPr>
+            <a:cxnSpLocks/>
+          </p:cNvCxnSpPr>
+          <p:nvPr/>
+        </p:nvCxnSpPr>
+        <p:spPr>
+          <a:xfrm flipH="1">
+            <a:off x="10330567" y="1966615"/>
+            <a:ext cx="4621" cy="2754767"/>
           </a:xfrm>
           <a:prstGeom prst="straightConnector1">
             <a:avLst/>
@@ -3051,7 +5894,7 @@
           <p:nvPr/>
         </p:nvPicPr>
         <p:blipFill rotWithShape="1">
-          <a:blip r:embed="rId6">
+          <a:blip r:embed="rId5">
             <a:extLst>
               <a:ext uri="{28A0092B-C50C-407E-A947-70E740481C1C}">
                 <a14:useLocalDpi xmlns:a14="http://schemas.microsoft.com/office/drawing/2010/main" val="0"/>
@@ -3096,7 +5939,7 @@
           <p:nvPr/>
         </p:nvPicPr>
         <p:blipFill>
-          <a:blip r:embed="rId7">
+          <a:blip r:embed="rId6">
             <a:extLst>
               <a:ext uri="{28A0092B-C50C-407E-A947-70E740481C1C}">
                 <a14:useLocalDpi xmlns:a14="http://schemas.microsoft.com/office/drawing/2010/main" val="0"/>
@@ -3130,10 +5973,46 @@
       </p:pic>
       <p:sp>
         <p:nvSpPr>
-          <p:cNvPr id="16" name="Rectangle: Rounded Corners 15">
-            <a:extLst>
-              <a:ext uri="{FF2B5EF4-FFF2-40B4-BE49-F238E27FC236}">
-                <a16:creationId xmlns:a16="http://schemas.microsoft.com/office/drawing/2014/main" id="{14B497D0-2328-4FE4-B2A3-81D3845514C5}"/>
+          <p:cNvPr id="38" name="TextBox 37">
+            <a:extLst>
+              <a:ext uri="{FF2B5EF4-FFF2-40B4-BE49-F238E27FC236}">
+                <a16:creationId xmlns:a16="http://schemas.microsoft.com/office/drawing/2014/main" id="{825263F5-05B5-4E96-BBD4-B801A73A93CD}"/>
+              </a:ext>
+            </a:extLst>
+          </p:cNvPr>
+          <p:cNvSpPr txBox="1"/>
+          <p:nvPr/>
+        </p:nvSpPr>
+        <p:spPr>
+          <a:xfrm>
+            <a:off x="9677391" y="395303"/>
+            <a:ext cx="2364807" cy="369332"/>
+          </a:xfrm>
+          <a:prstGeom prst="rect">
+            <a:avLst/>
+          </a:prstGeom>
+          <a:noFill/>
+        </p:spPr>
+        <p:txBody>
+          <a:bodyPr wrap="square" rtlCol="0">
+            <a:spAutoFit/>
+          </a:bodyPr>
+          <a:lstStyle/>
+          <a:p>
+            <a:pPr algn="ctr"/>
+            <a:r>
+              <a:rPr lang="en-US" b="1" dirty="0"/>
+              <a:t>github.com</a:t>
+            </a:r>
+          </a:p>
+        </p:txBody>
+      </p:sp>
+      <p:sp>
+        <p:nvSpPr>
+          <p:cNvPr id="1025" name="Rectangle: Rounded Corners 1024">
+            <a:extLst>
+              <a:ext uri="{FF2B5EF4-FFF2-40B4-BE49-F238E27FC236}">
+                <a16:creationId xmlns:a16="http://schemas.microsoft.com/office/drawing/2014/main" id="{CBC49110-8BEF-47C6-B0B8-63E05F7D97F1}"/>
               </a:ext>
             </a:extLst>
           </p:cNvPr>
@@ -3142,18 +6021,19 @@
         </p:nvSpPr>
         <p:spPr>
           <a:xfrm>
-            <a:off x="457199" y="312754"/>
-            <a:ext cx="11584999" cy="2049446"/>
+            <a:off x="1904997" y="312754"/>
+            <a:ext cx="5523563" cy="1817828"/>
           </a:xfrm>
           <a:prstGeom prst="roundRect">
             <a:avLst/>
           </a:prstGeom>
-          <a:noFill/>
+          <a:solidFill>
+            <a:schemeClr val="bg1"/>
+          </a:solidFill>
           <a:ln>
             <a:solidFill>
               <a:srgbClr val="3F51B5"/>
             </a:solidFill>
-            <a:prstDash val="dash"/>
           </a:ln>
         </p:spPr>
         <p:style>
@@ -3176,17 +6056,102 @@
           <a:bodyPr rtlCol="0" anchor="ctr"/>
           <a:lstStyle/>
           <a:p>
-            <a:pPr algn="ctr"/>
-            <a:endParaRPr lang="en-US"/>
-          </a:p>
-        </p:txBody>
-      </p:sp>
-      <p:sp>
-        <p:nvSpPr>
-          <p:cNvPr id="27" name="Rectangle: Rounded Corners 26">
-            <a:extLst>
-              <a:ext uri="{FF2B5EF4-FFF2-40B4-BE49-F238E27FC236}">
-                <a16:creationId xmlns:a16="http://schemas.microsoft.com/office/drawing/2014/main" id="{3E3EC81A-B589-412F-8603-0877A3A627FE}"/>
+            <a:pPr marL="182563" indent="-182563">
+              <a:buFont typeface="Arial" panose="020B0604020202020204" pitchFamily="34" charset="0"/>
+              <a:buChar char="•"/>
+            </a:pPr>
+            <a:r>
+              <a:rPr lang="en-US" sz="2100" b="1" dirty="0">
+                <a:solidFill>
+                  <a:schemeClr val="tx1"/>
+                </a:solidFill>
+              </a:rPr>
+              <a:t>Gmail.com </a:t>
+            </a:r>
+            <a:r>
+              <a:rPr lang="en-US" sz="2100" dirty="0">
+                <a:solidFill>
+                  <a:schemeClr val="tx1"/>
+                </a:solidFill>
+              </a:rPr>
+              <a:t>is the biggest web host of e-mail.</a:t>
+            </a:r>
+          </a:p>
+          <a:p>
+            <a:pPr marL="182563" indent="-182563">
+              <a:buFont typeface="Arial" panose="020B0604020202020204" pitchFamily="34" charset="0"/>
+              <a:buChar char="•"/>
+            </a:pPr>
+            <a:r>
+              <a:rPr lang="en-US" sz="2100" b="1" dirty="0">
+                <a:solidFill>
+                  <a:schemeClr val="tx1"/>
+                </a:solidFill>
+              </a:rPr>
+              <a:t>GitHub.com </a:t>
+            </a:r>
+            <a:r>
+              <a:rPr lang="en-US" sz="2100" dirty="0">
+                <a:solidFill>
+                  <a:schemeClr val="tx1"/>
+                </a:solidFill>
+              </a:rPr>
+              <a:t>is the biggest web host of Git projects. </a:t>
+            </a:r>
+          </a:p>
+        </p:txBody>
+      </p:sp>
+      <p:pic>
+        <p:nvPicPr>
+          <p:cNvPr id="24" name="Picture 2" descr="Image result for gmail.com logo">
+            <a:extLst>
+              <a:ext uri="{FF2B5EF4-FFF2-40B4-BE49-F238E27FC236}">
+                <a16:creationId xmlns:a16="http://schemas.microsoft.com/office/drawing/2014/main" id="{ADDF27AF-BCEA-4F96-8C3E-19F505BB1128}"/>
+              </a:ext>
+            </a:extLst>
+          </p:cNvPr>
+          <p:cNvPicPr>
+            <a:picLocks noChangeAspect="1" noChangeArrowheads="1"/>
+          </p:cNvPicPr>
+          <p:nvPr/>
+        </p:nvPicPr>
+        <p:blipFill rotWithShape="1">
+          <a:blip r:embed="rId7">
+            <a:extLst>
+              <a:ext uri="{28A0092B-C50C-407E-A947-70E740481C1C}">
+                <a14:useLocalDpi xmlns:a14="http://schemas.microsoft.com/office/drawing/2010/main" val="0"/>
+              </a:ext>
+            </a:extLst>
+          </a:blip>
+          <a:srcRect r="-3654" b="24854"/>
+          <a:stretch/>
+        </p:blipFill>
+        <p:spPr bwMode="auto">
+          <a:xfrm>
+            <a:off x="7619999" y="535080"/>
+            <a:ext cx="1974611" cy="1431535"/>
+          </a:xfrm>
+          <a:prstGeom prst="rect">
+            <a:avLst/>
+          </a:prstGeom>
+          <a:noFill/>
+          <a:extLst>
+            <a:ext uri="{909E8E84-426E-40DD-AFC4-6F175D3DCCD1}">
+              <a14:hiddenFill xmlns:a14="http://schemas.microsoft.com/office/drawing/2010/main">
+                <a:solidFill>
+                  <a:srgbClr val="FFFFFF"/>
+                </a:solidFill>
+              </a14:hiddenFill>
+            </a:ext>
+          </a:extLst>
+        </p:spPr>
+      </p:pic>
+      <p:sp>
+        <p:nvSpPr>
+          <p:cNvPr id="42" name="Rectangle: Rounded Corners 41">
+            <a:extLst>
+              <a:ext uri="{FF2B5EF4-FFF2-40B4-BE49-F238E27FC236}">
+                <a16:creationId xmlns:a16="http://schemas.microsoft.com/office/drawing/2014/main" id="{52719AC5-7973-4092-B284-74CA607E417F}"/>
               </a:ext>
             </a:extLst>
           </p:cNvPr>
@@ -3195,18 +6160,19 @@
         </p:nvSpPr>
         <p:spPr>
           <a:xfrm>
-            <a:off x="457200" y="2605691"/>
-            <a:ext cx="11585018" cy="1707323"/>
+            <a:off x="1904979" y="2321321"/>
+            <a:ext cx="5523582" cy="1991693"/>
           </a:xfrm>
           <a:prstGeom prst="roundRect">
             <a:avLst/>
           </a:prstGeom>
-          <a:noFill/>
+          <a:solidFill>
+            <a:schemeClr val="bg1"/>
+          </a:solidFill>
           <a:ln>
             <a:solidFill>
               <a:srgbClr val="3F51B5"/>
             </a:solidFill>
-            <a:prstDash val="dash"/>
           </a:ln>
         </p:spPr>
         <p:style>
@@ -3229,89 +6195,57 @@
           <a:bodyPr rtlCol="0" anchor="ctr"/>
           <a:lstStyle/>
           <a:p>
-            <a:pPr algn="ctr"/>
-            <a:endParaRPr lang="en-US" dirty="0"/>
-          </a:p>
-        </p:txBody>
-      </p:sp>
-      <p:sp>
-        <p:nvSpPr>
-          <p:cNvPr id="1024" name="TextBox 1023">
-            <a:extLst>
-              <a:ext uri="{FF2B5EF4-FFF2-40B4-BE49-F238E27FC236}">
-                <a16:creationId xmlns:a16="http://schemas.microsoft.com/office/drawing/2014/main" id="{31B024FE-EE37-49BB-A374-1738F28F2179}"/>
-              </a:ext>
-            </a:extLst>
-          </p:cNvPr>
-          <p:cNvSpPr txBox="1"/>
-          <p:nvPr/>
-        </p:nvSpPr>
-        <p:spPr>
-          <a:xfrm>
-            <a:off x="7487508" y="398142"/>
-            <a:ext cx="1905000" cy="369332"/>
-          </a:xfrm>
-          <a:prstGeom prst="rect">
-            <a:avLst/>
-          </a:prstGeom>
-          <a:noFill/>
-        </p:spPr>
-        <p:txBody>
-          <a:bodyPr wrap="square" rtlCol="0">
-            <a:spAutoFit/>
-          </a:bodyPr>
-          <a:lstStyle/>
-          <a:p>
-            <a:pPr algn="ctr"/>
-            <a:r>
-              <a:rPr lang="en-US" dirty="0"/>
-              <a:t>gmail.com</a:t>
-            </a:r>
-          </a:p>
-        </p:txBody>
-      </p:sp>
-      <p:sp>
-        <p:nvSpPr>
-          <p:cNvPr id="38" name="TextBox 37">
-            <a:extLst>
-              <a:ext uri="{FF2B5EF4-FFF2-40B4-BE49-F238E27FC236}">
-                <a16:creationId xmlns:a16="http://schemas.microsoft.com/office/drawing/2014/main" id="{825263F5-05B5-4E96-BBD4-B801A73A93CD}"/>
-              </a:ext>
-            </a:extLst>
-          </p:cNvPr>
-          <p:cNvSpPr txBox="1"/>
-          <p:nvPr/>
-        </p:nvSpPr>
-        <p:spPr>
-          <a:xfrm>
-            <a:off x="9874743" y="417582"/>
-            <a:ext cx="1905000" cy="369332"/>
-          </a:xfrm>
-          <a:prstGeom prst="rect">
-            <a:avLst/>
-          </a:prstGeom>
-          <a:noFill/>
-        </p:spPr>
-        <p:txBody>
-          <a:bodyPr wrap="square" rtlCol="0">
-            <a:spAutoFit/>
-          </a:bodyPr>
-          <a:lstStyle/>
-          <a:p>
-            <a:pPr algn="ctr"/>
-            <a:r>
-              <a:rPr lang="en-US" dirty="0"/>
-              <a:t>github.com</a:t>
-            </a:r>
-          </a:p>
-        </p:txBody>
-      </p:sp>
-      <p:sp>
-        <p:nvSpPr>
-          <p:cNvPr id="1025" name="Rectangle: Rounded Corners 1024">
-            <a:extLst>
-              <a:ext uri="{FF2B5EF4-FFF2-40B4-BE49-F238E27FC236}">
-                <a16:creationId xmlns:a16="http://schemas.microsoft.com/office/drawing/2014/main" id="{CBC49110-8BEF-47C6-B0B8-63E05F7D97F1}"/>
+            <a:pPr marL="182563" indent="-182563">
+              <a:buFont typeface="Arial" panose="020B0604020202020204" pitchFamily="34" charset="0"/>
+              <a:buChar char="•"/>
+            </a:pPr>
+            <a:r>
+              <a:rPr lang="en-US" sz="2100" b="1" dirty="0">
+                <a:solidFill>
+                  <a:schemeClr val="tx1"/>
+                </a:solidFill>
+              </a:rPr>
+              <a:t>E-mail </a:t>
+            </a:r>
+            <a:r>
+              <a:rPr lang="en-US" sz="2100" dirty="0">
+                <a:solidFill>
+                  <a:schemeClr val="tx1"/>
+                </a:solidFill>
+              </a:rPr>
+              <a:t>is a protocol for sending letters online, it’s the same no matter which e-mail server you use</a:t>
+            </a:r>
+          </a:p>
+          <a:p>
+            <a:pPr marL="182563" indent="-182563">
+              <a:buFont typeface="Arial" panose="020B0604020202020204" pitchFamily="34" charset="0"/>
+              <a:buChar char="•"/>
+            </a:pPr>
+            <a:r>
+              <a:rPr lang="en-US" sz="2100" b="1" dirty="0">
+                <a:solidFill>
+                  <a:schemeClr val="tx1"/>
+                </a:solidFill>
+              </a:rPr>
+              <a:t>Git </a:t>
+            </a:r>
+            <a:r>
+              <a:rPr lang="en-US" sz="2100" dirty="0">
+                <a:solidFill>
+                  <a:schemeClr val="tx1"/>
+                </a:solidFill>
+              </a:rPr>
+              <a:t>is a protocol for sharing versions of your code, it’s the same thing on all Git servers</a:t>
+            </a:r>
+          </a:p>
+        </p:txBody>
+      </p:sp>
+      <p:sp>
+        <p:nvSpPr>
+          <p:cNvPr id="44" name="Rectangle: Rounded Corners 43">
+            <a:extLst>
+              <a:ext uri="{FF2B5EF4-FFF2-40B4-BE49-F238E27FC236}">
+                <a16:creationId xmlns:a16="http://schemas.microsoft.com/office/drawing/2014/main" id="{341C4D75-7306-4A89-BAFD-7307BA2EB7AE}"/>
               </a:ext>
             </a:extLst>
           </p:cNvPr>
@@ -3320,13 +6254,15 @@
         </p:nvSpPr>
         <p:spPr>
           <a:xfrm>
-            <a:off x="457198" y="312754"/>
-            <a:ext cx="6557473" cy="2049446"/>
+            <a:off x="1904978" y="4503755"/>
+            <a:ext cx="5523581" cy="2068434"/>
           </a:xfrm>
           <a:prstGeom prst="roundRect">
             <a:avLst/>
           </a:prstGeom>
-          <a:noFill/>
+          <a:solidFill>
+            <a:schemeClr val="bg1"/>
+          </a:solidFill>
           <a:ln>
             <a:solidFill>
               <a:srgbClr val="3F51B5"/>
@@ -3358,20 +6294,28 @@
               <a:buChar char="•"/>
             </a:pPr>
             <a:r>
-              <a:rPr lang="en-US" sz="2000" b="1" dirty="0">
+              <a:rPr lang="en-US" sz="2100" dirty="0">
                 <a:solidFill>
                   <a:schemeClr val="tx1"/>
                 </a:solidFill>
               </a:rPr>
-              <a:t>GITHUB.COM </a:t>
-            </a:r>
-            <a:r>
-              <a:rPr lang="en-US" sz="2000" dirty="0">
+              <a:t>An </a:t>
+            </a:r>
+            <a:r>
+              <a:rPr lang="en-US" sz="2100" b="1" dirty="0">
                 <a:solidFill>
                   <a:schemeClr val="tx1"/>
                 </a:solidFill>
               </a:rPr>
-              <a:t>is similar to webmail, like gmail.com or webmail.worldbank.com. </a:t>
+              <a:t>e-mail client </a:t>
+            </a:r>
+            <a:r>
+              <a:rPr lang="en-US" sz="2100" dirty="0">
+                <a:solidFill>
+                  <a:schemeClr val="tx1"/>
+                </a:solidFill>
+              </a:rPr>
+              <a:t>is a desktop application that gives you easy access to features on your mail server</a:t>
             </a:r>
           </a:p>
           <a:p>
@@ -3380,263 +6324,28 @@
               <a:buChar char="•"/>
             </a:pPr>
             <a:r>
-              <a:rPr lang="en-US" sz="2000" dirty="0">
+              <a:rPr lang="en-US" sz="2100" dirty="0">
                 <a:solidFill>
                   <a:schemeClr val="tx1"/>
                 </a:solidFill>
               </a:rPr>
-              <a:t>Instead of storing emails in the cloud, GitHub.com stores versions of your code. </a:t>
-            </a:r>
-          </a:p>
-          <a:p>
-            <a:pPr marL="182563" indent="-182563">
-              <a:buFont typeface="Arial" panose="020B0604020202020204" pitchFamily="34" charset="0"/>
-              <a:buChar char="•"/>
-            </a:pPr>
-            <a:r>
-              <a:rPr lang="en-US" sz="2000" dirty="0">
+              <a:t>A </a:t>
+            </a:r>
+            <a:r>
+              <a:rPr lang="en-US" sz="2100" b="1" dirty="0">
                 <a:solidFill>
                   <a:schemeClr val="tx1"/>
                 </a:solidFill>
               </a:rPr>
-              <a:t>GitHub.com is also a project management tool, but don’t worry about that yet</a:t>
-            </a:r>
-          </a:p>
-        </p:txBody>
-      </p:sp>
-      <p:sp>
-        <p:nvSpPr>
-          <p:cNvPr id="42" name="Rectangle: Rounded Corners 41">
-            <a:extLst>
-              <a:ext uri="{FF2B5EF4-FFF2-40B4-BE49-F238E27FC236}">
-                <a16:creationId xmlns:a16="http://schemas.microsoft.com/office/drawing/2014/main" id="{52719AC5-7973-4092-B284-74CA607E417F}"/>
-              </a:ext>
-            </a:extLst>
-          </p:cNvPr>
-          <p:cNvSpPr/>
-          <p:nvPr/>
-        </p:nvSpPr>
-        <p:spPr>
-          <a:xfrm>
-            <a:off x="457200" y="2605691"/>
-            <a:ext cx="6557473" cy="1707323"/>
-          </a:xfrm>
-          <a:prstGeom prst="roundRect">
-            <a:avLst/>
-          </a:prstGeom>
-          <a:noFill/>
-          <a:ln>
-            <a:solidFill>
-              <a:srgbClr val="3F51B5"/>
-            </a:solidFill>
-          </a:ln>
-        </p:spPr>
-        <p:style>
-          <a:lnRef idx="2">
-            <a:schemeClr val="accent1">
-              <a:shade val="50000"/>
-            </a:schemeClr>
-          </a:lnRef>
-          <a:fillRef idx="1">
-            <a:schemeClr val="accent1"/>
-          </a:fillRef>
-          <a:effectRef idx="0">
-            <a:schemeClr val="accent1"/>
-          </a:effectRef>
-          <a:fontRef idx="minor">
-            <a:schemeClr val="lt1"/>
-          </a:fontRef>
-        </p:style>
-        <p:txBody>
-          <a:bodyPr rtlCol="0" anchor="ctr"/>
-          <a:lstStyle/>
-          <a:p>
-            <a:pPr marL="182563" indent="-182563">
-              <a:buFont typeface="Arial" panose="020B0604020202020204" pitchFamily="34" charset="0"/>
-              <a:buChar char="•"/>
-            </a:pPr>
-            <a:r>
-              <a:rPr lang="en-US" sz="2000" dirty="0">
+              <a:t>git client </a:t>
+            </a:r>
+            <a:r>
+              <a:rPr lang="en-US" sz="2100" dirty="0">
                 <a:solidFill>
                   <a:schemeClr val="tx1"/>
                 </a:solidFill>
               </a:rPr>
-              <a:t>Just as e-mail is a protocol for sending digital letters on the internet, </a:t>
-            </a:r>
-            <a:r>
-              <a:rPr lang="en-US" sz="2000" b="1" dirty="0">
-                <a:solidFill>
-                  <a:schemeClr val="tx1"/>
-                </a:solidFill>
-              </a:rPr>
-              <a:t>GIT</a:t>
-            </a:r>
-            <a:r>
-              <a:rPr lang="en-US" sz="2000" dirty="0">
-                <a:solidFill>
-                  <a:schemeClr val="tx1"/>
-                </a:solidFill>
-              </a:rPr>
-              <a:t> is a protocol for sharing code version online</a:t>
-            </a:r>
-          </a:p>
-          <a:p>
-            <a:pPr marL="182563" indent="-182563">
-              <a:buFont typeface="Arial" panose="020B0604020202020204" pitchFamily="34" charset="0"/>
-              <a:buChar char="•"/>
-            </a:pPr>
-            <a:r>
-              <a:rPr lang="en-US" sz="2000" dirty="0">
-                <a:solidFill>
-                  <a:schemeClr val="tx1"/>
-                </a:solidFill>
-              </a:rPr>
-              <a:t>You do not need to understand how git works, just like you do not need to understand how emails actually works</a:t>
-            </a:r>
-          </a:p>
-        </p:txBody>
-      </p:sp>
-      <p:sp>
-        <p:nvSpPr>
-          <p:cNvPr id="43" name="Rectangle: Rounded Corners 42">
-            <a:extLst>
-              <a:ext uri="{FF2B5EF4-FFF2-40B4-BE49-F238E27FC236}">
-                <a16:creationId xmlns:a16="http://schemas.microsoft.com/office/drawing/2014/main" id="{A1C14A0E-8A47-4DF1-8097-95F7A82C8311}"/>
-              </a:ext>
-            </a:extLst>
-          </p:cNvPr>
-          <p:cNvSpPr/>
-          <p:nvPr/>
-        </p:nvSpPr>
-        <p:spPr>
-          <a:xfrm>
-            <a:off x="457199" y="4503755"/>
-            <a:ext cx="11585019" cy="2068434"/>
-          </a:xfrm>
-          <a:prstGeom prst="roundRect">
-            <a:avLst/>
-          </a:prstGeom>
-          <a:noFill/>
-          <a:ln>
-            <a:solidFill>
-              <a:srgbClr val="3F51B5"/>
-            </a:solidFill>
-            <a:prstDash val="dash"/>
-          </a:ln>
-        </p:spPr>
-        <p:style>
-          <a:lnRef idx="2">
-            <a:schemeClr val="accent1">
-              <a:shade val="50000"/>
-            </a:schemeClr>
-          </a:lnRef>
-          <a:fillRef idx="1">
-            <a:schemeClr val="accent1"/>
-          </a:fillRef>
-          <a:effectRef idx="0">
-            <a:schemeClr val="accent1"/>
-          </a:effectRef>
-          <a:fontRef idx="minor">
-            <a:schemeClr val="lt1"/>
-          </a:fontRef>
-        </p:style>
-        <p:txBody>
-          <a:bodyPr rtlCol="0" anchor="ctr"/>
-          <a:lstStyle/>
-          <a:p>
-            <a:pPr algn="ctr"/>
-            <a:endParaRPr lang="en-US" dirty="0"/>
-          </a:p>
-        </p:txBody>
-      </p:sp>
-      <p:sp>
-        <p:nvSpPr>
-          <p:cNvPr id="44" name="Rectangle: Rounded Corners 43">
-            <a:extLst>
-              <a:ext uri="{FF2B5EF4-FFF2-40B4-BE49-F238E27FC236}">
-                <a16:creationId xmlns:a16="http://schemas.microsoft.com/office/drawing/2014/main" id="{341C4D75-7306-4A89-BAFD-7307BA2EB7AE}"/>
-              </a:ext>
-            </a:extLst>
-          </p:cNvPr>
-          <p:cNvSpPr/>
-          <p:nvPr/>
-        </p:nvSpPr>
-        <p:spPr>
-          <a:xfrm>
-            <a:off x="457199" y="4503755"/>
-            <a:ext cx="6617766" cy="2068434"/>
-          </a:xfrm>
-          <a:prstGeom prst="roundRect">
-            <a:avLst/>
-          </a:prstGeom>
-          <a:noFill/>
-          <a:ln>
-            <a:solidFill>
-              <a:srgbClr val="3F51B5"/>
-            </a:solidFill>
-          </a:ln>
-        </p:spPr>
-        <p:style>
-          <a:lnRef idx="2">
-            <a:schemeClr val="accent1">
-              <a:shade val="50000"/>
-            </a:schemeClr>
-          </a:lnRef>
-          <a:fillRef idx="1">
-            <a:schemeClr val="accent1"/>
-          </a:fillRef>
-          <a:effectRef idx="0">
-            <a:schemeClr val="accent1"/>
-          </a:effectRef>
-          <a:fontRef idx="minor">
-            <a:schemeClr val="lt1"/>
-          </a:fontRef>
-        </p:style>
-        <p:txBody>
-          <a:bodyPr rtlCol="0" anchor="ctr"/>
-          <a:lstStyle/>
-          <a:p>
-            <a:pPr marL="182563" indent="-182563">
-              <a:buFont typeface="Arial" panose="020B0604020202020204" pitchFamily="34" charset="0"/>
-              <a:buChar char="•"/>
-            </a:pPr>
-            <a:r>
-              <a:rPr lang="en-US" sz="2000" dirty="0">
-                <a:solidFill>
-                  <a:schemeClr val="tx1"/>
-                </a:solidFill>
-              </a:rPr>
-              <a:t>While you can send emails online directly form your webmail, for large scale professional work you are likely to use a mail client (outlook or apple mail)</a:t>
-            </a:r>
-          </a:p>
-          <a:p>
-            <a:pPr marL="182563" indent="-182563">
-              <a:buFont typeface="Arial" panose="020B0604020202020204" pitchFamily="34" charset="0"/>
-              <a:buChar char="•"/>
-            </a:pPr>
-            <a:r>
-              <a:rPr lang="en-US" sz="2000" dirty="0">
-                <a:solidFill>
-                  <a:schemeClr val="tx1"/>
-                </a:solidFill>
-              </a:rPr>
-              <a:t>For git you use a </a:t>
-            </a:r>
-            <a:r>
-              <a:rPr lang="en-US" sz="2000" b="1" dirty="0">
-                <a:solidFill>
-                  <a:schemeClr val="tx1"/>
-                </a:solidFill>
-              </a:rPr>
-              <a:t>GIT CLIENT</a:t>
-            </a:r>
-            <a:r>
-              <a:rPr lang="en-US" sz="2000" dirty="0">
-                <a:solidFill>
-                  <a:schemeClr val="tx1"/>
-                </a:solidFill>
-              </a:rPr>
-              <a:t>. For git the difference between web and client is bigger, so you will want to use this even if you prefer to send your emails on webmail</a:t>
+              <a:t>is a desktop application that gives you easy access to features on your git server</a:t>
             </a:r>
           </a:p>
         </p:txBody>
@@ -3655,7 +6364,7 @@
         </p:nvSpPr>
         <p:spPr>
           <a:xfrm>
-            <a:off x="8133493" y="3178774"/>
+            <a:off x="8114570" y="2994003"/>
             <a:ext cx="1144434" cy="646331"/>
           </a:xfrm>
           <a:prstGeom prst="rect">
@@ -3691,7 +6400,7 @@
         </p:nvSpPr>
         <p:spPr>
           <a:xfrm>
-            <a:off x="10498528" y="3178774"/>
+            <a:off x="10599456" y="2994001"/>
             <a:ext cx="1144434" cy="646331"/>
           </a:xfrm>
           <a:prstGeom prst="rect">
@@ -3720,10 +6429,46 @@
           </a:p>
         </p:txBody>
       </p:sp>
+      <p:sp>
+        <p:nvSpPr>
+          <p:cNvPr id="1024" name="TextBox 1023">
+            <a:extLst>
+              <a:ext uri="{FF2B5EF4-FFF2-40B4-BE49-F238E27FC236}">
+                <a16:creationId xmlns:a16="http://schemas.microsoft.com/office/drawing/2014/main" id="{31B024FE-EE37-49BB-A374-1738F28F2179}"/>
+              </a:ext>
+            </a:extLst>
+          </p:cNvPr>
+          <p:cNvSpPr txBox="1"/>
+          <p:nvPr/>
+        </p:nvSpPr>
+        <p:spPr>
+          <a:xfrm>
+            <a:off x="7428561" y="398142"/>
+            <a:ext cx="2248830" cy="369332"/>
+          </a:xfrm>
+          <a:prstGeom prst="rect">
+            <a:avLst/>
+          </a:prstGeom>
+          <a:noFill/>
+        </p:spPr>
+        <p:txBody>
+          <a:bodyPr wrap="square" rtlCol="0">
+            <a:spAutoFit/>
+          </a:bodyPr>
+          <a:lstStyle/>
+          <a:p>
+            <a:pPr algn="ctr"/>
+            <a:r>
+              <a:rPr lang="en-US" b="1" dirty="0"/>
+              <a:t>gmail.com</a:t>
+            </a:r>
+          </a:p>
+        </p:txBody>
+      </p:sp>
     </p:spTree>
     <p:extLst>
       <p:ext uri="{BB962C8B-B14F-4D97-AF65-F5344CB8AC3E}">
-        <p14:creationId xmlns:p14="http://schemas.microsoft.com/office/powerpoint/2010/main" val="578278343"/>
+        <p14:creationId xmlns:p14="http://schemas.microsoft.com/office/powerpoint/2010/main" val="1441947620"/>
       </p:ext>
     </p:extLst>
   </p:cSld>

</xml_diff>